<commit_message>
Added NN/CNN part of our presentation
</commit_message>
<xml_diff>
--- a/docs/DocumentationFigures.pptx
+++ b/docs/DocumentationFigures.pptx
@@ -107,6 +107,11 @@
       </a:defRPr>
     </a:lvl9pPr>
   </p:defaultTextStyle>
+  <p:extLst>
+    <p:ext uri="{EFAFB233-063F-42B5-8137-9DF3F51BA10A}">
+      <p15:sldGuideLst xmlns:p15="http://schemas.microsoft.com/office/powerpoint/2012/main"/>
+    </p:ext>
+  </p:extLst>
 </p:presentation>
 </file>
 
@@ -192,7 +197,7 @@
           <a:p>
             <a:fld id="{07372395-1345-5242-86C8-8BFA020EFA0E}" type="datetimeFigureOut">
               <a:rPr lang="en-FR" smtClean="0"/>
-              <a:t>04/02/2021</a:t>
+              <a:t>11/02/2021</a:t>
             </a:fld>
             <a:endParaRPr lang="en-FR"/>
           </a:p>
@@ -693,7 +698,7 @@
           <a:p>
             <a:fld id="{33CC349A-D6B2-9444-83E9-E05BA33BD8A1}" type="datetimeFigureOut">
               <a:rPr lang="en-FR" smtClean="0"/>
-              <a:t>04/02/2021</a:t>
+              <a:t>11/02/2021</a:t>
             </a:fld>
             <a:endParaRPr lang="en-FR"/>
           </a:p>
@@ -893,7 +898,7 @@
           <a:p>
             <a:fld id="{33CC349A-D6B2-9444-83E9-E05BA33BD8A1}" type="datetimeFigureOut">
               <a:rPr lang="en-FR" smtClean="0"/>
-              <a:t>04/02/2021</a:t>
+              <a:t>11/02/2021</a:t>
             </a:fld>
             <a:endParaRPr lang="en-FR"/>
           </a:p>
@@ -1103,7 +1108,7 @@
           <a:p>
             <a:fld id="{33CC349A-D6B2-9444-83E9-E05BA33BD8A1}" type="datetimeFigureOut">
               <a:rPr lang="en-FR" smtClean="0"/>
-              <a:t>04/02/2021</a:t>
+              <a:t>11/02/2021</a:t>
             </a:fld>
             <a:endParaRPr lang="en-FR"/>
           </a:p>
@@ -1303,7 +1308,7 @@
           <a:p>
             <a:fld id="{33CC349A-D6B2-9444-83E9-E05BA33BD8A1}" type="datetimeFigureOut">
               <a:rPr lang="en-FR" smtClean="0"/>
-              <a:t>04/02/2021</a:t>
+              <a:t>11/02/2021</a:t>
             </a:fld>
             <a:endParaRPr lang="en-FR"/>
           </a:p>
@@ -1579,7 +1584,7 @@
           <a:p>
             <a:fld id="{33CC349A-D6B2-9444-83E9-E05BA33BD8A1}" type="datetimeFigureOut">
               <a:rPr lang="en-FR" smtClean="0"/>
-              <a:t>04/02/2021</a:t>
+              <a:t>11/02/2021</a:t>
             </a:fld>
             <a:endParaRPr lang="en-FR"/>
           </a:p>
@@ -1847,7 +1852,7 @@
           <a:p>
             <a:fld id="{33CC349A-D6B2-9444-83E9-E05BA33BD8A1}" type="datetimeFigureOut">
               <a:rPr lang="en-FR" smtClean="0"/>
-              <a:t>04/02/2021</a:t>
+              <a:t>11/02/2021</a:t>
             </a:fld>
             <a:endParaRPr lang="en-FR"/>
           </a:p>
@@ -2262,7 +2267,7 @@
           <a:p>
             <a:fld id="{33CC349A-D6B2-9444-83E9-E05BA33BD8A1}" type="datetimeFigureOut">
               <a:rPr lang="en-FR" smtClean="0"/>
-              <a:t>04/02/2021</a:t>
+              <a:t>11/02/2021</a:t>
             </a:fld>
             <a:endParaRPr lang="en-FR"/>
           </a:p>
@@ -2404,7 +2409,7 @@
           <a:p>
             <a:fld id="{33CC349A-D6B2-9444-83E9-E05BA33BD8A1}" type="datetimeFigureOut">
               <a:rPr lang="en-FR" smtClean="0"/>
-              <a:t>04/02/2021</a:t>
+              <a:t>11/02/2021</a:t>
             </a:fld>
             <a:endParaRPr lang="en-FR"/>
           </a:p>
@@ -2517,7 +2522,7 @@
           <a:p>
             <a:fld id="{33CC349A-D6B2-9444-83E9-E05BA33BD8A1}" type="datetimeFigureOut">
               <a:rPr lang="en-FR" smtClean="0"/>
-              <a:t>04/02/2021</a:t>
+              <a:t>11/02/2021</a:t>
             </a:fld>
             <a:endParaRPr lang="en-FR"/>
           </a:p>
@@ -2830,7 +2835,7 @@
           <a:p>
             <a:fld id="{33CC349A-D6B2-9444-83E9-E05BA33BD8A1}" type="datetimeFigureOut">
               <a:rPr lang="en-FR" smtClean="0"/>
-              <a:t>04/02/2021</a:t>
+              <a:t>11/02/2021</a:t>
             </a:fld>
             <a:endParaRPr lang="en-FR"/>
           </a:p>
@@ -3119,7 +3124,7 @@
           <a:p>
             <a:fld id="{33CC349A-D6B2-9444-83E9-E05BA33BD8A1}" type="datetimeFigureOut">
               <a:rPr lang="en-FR" smtClean="0"/>
-              <a:t>04/02/2021</a:t>
+              <a:t>11/02/2021</a:t>
             </a:fld>
             <a:endParaRPr lang="en-FR"/>
           </a:p>
@@ -3362,7 +3367,7 @@
           <a:p>
             <a:fld id="{33CC349A-D6B2-9444-83E9-E05BA33BD8A1}" type="datetimeFigureOut">
               <a:rPr lang="en-FR" smtClean="0"/>
-              <a:t>04/02/2021</a:t>
+              <a:t>11/02/2021</a:t>
             </a:fld>
             <a:endParaRPr lang="en-FR"/>
           </a:p>
@@ -4541,7 +4546,7 @@
               <a:rPr lang="en-FR" sz="2000" dirty="0">
                 <a:latin typeface="Helvetica" pitchFamily="2" charset="0"/>
               </a:rPr>
-              <a:t>Feature Extraction</a:t>
+              <a:t>Spectrogram Extraction</a:t>
             </a:r>
           </a:p>
         </p:txBody>
@@ -4576,36 +4581,6 @@
           <a:xfrm>
             <a:off x="5017447" y="2491936"/>
             <a:ext cx="1759973" cy="717026"/>
-          </a:xfrm>
-          <a:prstGeom prst="rect">
-            <a:avLst/>
-          </a:prstGeom>
-        </p:spPr>
-      </p:pic>
-      <p:pic>
-        <p:nvPicPr>
-          <p:cNvPr id="29" name="Picture 28">
-            <a:extLst>
-              <a:ext uri="{FF2B5EF4-FFF2-40B4-BE49-F238E27FC236}">
-                <a16:creationId xmlns:a16="http://schemas.microsoft.com/office/drawing/2014/main" id="{DEADEE16-C84C-4D47-BAC3-DDE5099F6863}"/>
-              </a:ext>
-            </a:extLst>
-          </p:cNvPr>
-          <p:cNvPicPr>
-            <a:picLocks noChangeAspect="1"/>
-          </p:cNvPicPr>
-          <p:nvPr/>
-        </p:nvPicPr>
-        <p:blipFill>
-          <a:blip r:embed="rId6"/>
-          <a:stretch>
-            <a:fillRect/>
-          </a:stretch>
-        </p:blipFill>
-        <p:spPr>
-          <a:xfrm>
-            <a:off x="4808666" y="4249994"/>
-            <a:ext cx="2142767" cy="721657"/>
           </a:xfrm>
           <a:prstGeom prst="rect">
             <a:avLst/>
@@ -4783,7 +4758,7 @@
                 <a:ea typeface="Verdana" panose="020B0604030504040204" pitchFamily="34" charset="0"/>
                 <a:cs typeface="Verdana" panose="020B0604030504040204" pitchFamily="34" charset="0"/>
               </a:rPr>
-              <a:t>1000 rows</a:t>
+              <a:t>1000 images</a:t>
             </a:r>
           </a:p>
           <a:p>
@@ -4798,22 +4773,7 @@
                 <a:ea typeface="Verdana" panose="020B0604030504040204" pitchFamily="34" charset="0"/>
                 <a:cs typeface="Verdana" panose="020B0604030504040204" pitchFamily="34" charset="0"/>
               </a:rPr>
-              <a:t>28 columns</a:t>
-            </a:r>
-          </a:p>
-          <a:p>
-            <a:r>
-              <a:rPr lang="en-FR" sz="1200" dirty="0">
-                <a:solidFill>
-                  <a:schemeClr val="bg2">
-                    <a:lumMod val="50000"/>
-                  </a:schemeClr>
-                </a:solidFill>
-                <a:latin typeface="Verdana" panose="020B0604030504040204" pitchFamily="34" charset="0"/>
-                <a:ea typeface="Verdana" panose="020B0604030504040204" pitchFamily="34" charset="0"/>
-                <a:cs typeface="Verdana" panose="020B0604030504040204" pitchFamily="34" charset="0"/>
-              </a:rPr>
-              <a:t>Music Genre as label</a:t>
+              <a:t>4000 x 4000 pixels e each</a:t>
             </a:r>
           </a:p>
           <a:p>
@@ -4828,12 +4788,77 @@
           </a:p>
         </p:txBody>
       </p:sp>
+      <p:sp>
+        <p:nvSpPr>
+          <p:cNvPr id="35" name="TextBox 34">
+            <a:extLst>
+              <a:ext uri="{FF2B5EF4-FFF2-40B4-BE49-F238E27FC236}">
+                <a16:creationId xmlns:a16="http://schemas.microsoft.com/office/drawing/2014/main" id="{65509FEA-F791-DE4B-98B5-F5A82C55FB52}"/>
+              </a:ext>
+            </a:extLst>
+          </p:cNvPr>
+          <p:cNvSpPr txBox="1"/>
+          <p:nvPr/>
+        </p:nvSpPr>
+        <p:spPr>
+          <a:xfrm>
+            <a:off x="9219249" y="297072"/>
+            <a:ext cx="2145323" cy="369332"/>
+          </a:xfrm>
+          <a:prstGeom prst="rect">
+            <a:avLst/>
+          </a:prstGeom>
+          <a:noFill/>
+        </p:spPr>
+        <p:txBody>
+          <a:bodyPr wrap="square" rtlCol="0">
+            <a:spAutoFit/>
+          </a:bodyPr>
+          <a:lstStyle/>
+          <a:p>
+            <a:r>
+              <a:rPr lang="en-FR" dirty="0"/>
+              <a:t>1000 PNG Files</a:t>
+            </a:r>
+          </a:p>
+        </p:txBody>
+      </p:sp>
       <p:pic>
         <p:nvPicPr>
-          <p:cNvPr id="33" name="Picture 32">
-            <a:extLst>
-              <a:ext uri="{FF2B5EF4-FFF2-40B4-BE49-F238E27FC236}">
-                <a16:creationId xmlns:a16="http://schemas.microsoft.com/office/drawing/2014/main" id="{C535BA83-D234-5642-B36B-668EA9AA375D}"/>
+          <p:cNvPr id="2" name="Picture 1">
+            <a:extLst>
+              <a:ext uri="{FF2B5EF4-FFF2-40B4-BE49-F238E27FC236}">
+                <a16:creationId xmlns:a16="http://schemas.microsoft.com/office/drawing/2014/main" id="{048100BA-5A79-2A4B-BFD7-09B0748D4C96}"/>
+              </a:ext>
+            </a:extLst>
+          </p:cNvPr>
+          <p:cNvPicPr>
+            <a:picLocks noChangeAspect="1"/>
+          </p:cNvPicPr>
+          <p:nvPr/>
+        </p:nvPicPr>
+        <p:blipFill>
+          <a:blip r:embed="rId6"/>
+          <a:stretch>
+            <a:fillRect/>
+          </a:stretch>
+        </p:blipFill>
+        <p:spPr>
+          <a:xfrm>
+            <a:off x="4680641" y="4249994"/>
+            <a:ext cx="2433584" cy="584485"/>
+          </a:xfrm>
+          <a:prstGeom prst="rect">
+            <a:avLst/>
+          </a:prstGeom>
+        </p:spPr>
+      </p:pic>
+      <p:pic>
+        <p:nvPicPr>
+          <p:cNvPr id="7" name="Picture 6">
+            <a:extLst>
+              <a:ext uri="{FF2B5EF4-FFF2-40B4-BE49-F238E27FC236}">
+                <a16:creationId xmlns:a16="http://schemas.microsoft.com/office/drawing/2014/main" id="{80E15F98-996B-534A-8A02-1B14DFED1F49}"/>
               </a:ext>
             </a:extLst>
           </p:cNvPr>
@@ -4850,8 +4875,8 @@
         </p:blipFill>
         <p:spPr>
           <a:xfrm>
-            <a:off x="9098514" y="2318783"/>
-            <a:ext cx="2747844" cy="2747844"/>
+            <a:off x="9910581" y="1806136"/>
+            <a:ext cx="1371600" cy="1371600"/>
           </a:xfrm>
           <a:prstGeom prst="rect">
             <a:avLst/>
@@ -4860,252 +4885,109 @@
       </p:pic>
       <p:sp>
         <p:nvSpPr>
-          <p:cNvPr id="35" name="TextBox 34">
-            <a:extLst>
-              <a:ext uri="{FF2B5EF4-FFF2-40B4-BE49-F238E27FC236}">
-                <a16:creationId xmlns:a16="http://schemas.microsoft.com/office/drawing/2014/main" id="{65509FEA-F791-DE4B-98B5-F5A82C55FB52}"/>
-              </a:ext>
-            </a:extLst>
-          </p:cNvPr>
-          <p:cNvSpPr txBox="1"/>
+          <p:cNvPr id="8" name="Rectangle 7">
+            <a:extLst>
+              <a:ext uri="{FF2B5EF4-FFF2-40B4-BE49-F238E27FC236}">
+                <a16:creationId xmlns:a16="http://schemas.microsoft.com/office/drawing/2014/main" id="{1CE3366F-BCA7-0F43-9553-0A65FC802642}"/>
+              </a:ext>
+            </a:extLst>
+          </p:cNvPr>
+          <p:cNvSpPr/>
           <p:nvPr/>
         </p:nvSpPr>
         <p:spPr>
           <a:xfrm>
-            <a:off x="9219249" y="297072"/>
-            <a:ext cx="2145323" cy="369332"/>
+            <a:off x="9951367" y="3264516"/>
+            <a:ext cx="1330814" cy="369332"/>
           </a:xfrm>
           <a:prstGeom prst="rect">
             <a:avLst/>
           </a:prstGeom>
-          <a:noFill/>
         </p:spPr>
         <p:txBody>
-          <a:bodyPr wrap="square" rtlCol="0">
+          <a:bodyPr wrap="none">
             <a:spAutoFit/>
           </a:bodyPr>
           <a:lstStyle/>
           <a:p>
+            <a:pPr algn="ctr"/>
+            <a:r>
+              <a:rPr lang="en-GB" dirty="0"/>
+              <a:t>b</a:t>
+            </a:r>
             <a:r>
               <a:rPr lang="en-FR" dirty="0"/>
-              <a:t>Single .CSV Dataset</a:t>
-            </a:r>
-          </a:p>
-        </p:txBody>
-      </p:sp>
-      <p:sp>
-        <p:nvSpPr>
-          <p:cNvPr id="36" name="TextBox 35">
-            <a:extLst>
-              <a:ext uri="{FF2B5EF4-FFF2-40B4-BE49-F238E27FC236}">
-                <a16:creationId xmlns:a16="http://schemas.microsoft.com/office/drawing/2014/main" id="{E6C66B13-4AB3-4B4E-B0C2-0003865CB72E}"/>
-              </a:ext>
-            </a:extLst>
-          </p:cNvPr>
-          <p:cNvSpPr txBox="1"/>
+              <a:t>lues01.png</a:t>
+            </a:r>
+          </a:p>
+        </p:txBody>
+      </p:sp>
+      <p:pic>
+        <p:nvPicPr>
+          <p:cNvPr id="14" name="Picture 13">
+            <a:extLst>
+              <a:ext uri="{FF2B5EF4-FFF2-40B4-BE49-F238E27FC236}">
+                <a16:creationId xmlns:a16="http://schemas.microsoft.com/office/drawing/2014/main" id="{4203ABB8-657A-9547-B5CF-698E9B80CD1B}"/>
+              </a:ext>
+            </a:extLst>
+          </p:cNvPr>
+          <p:cNvPicPr>
+            <a:picLocks noChangeAspect="1"/>
+          </p:cNvPicPr>
           <p:nvPr/>
-        </p:nvSpPr>
+        </p:nvPicPr>
+        <p:blipFill>
+          <a:blip r:embed="rId8"/>
+          <a:stretch>
+            <a:fillRect/>
+          </a:stretch>
+        </p:blipFill>
         <p:spPr>
           <a:xfrm>
-            <a:off x="4496954" y="930572"/>
-            <a:ext cx="4555153" cy="1477328"/>
+            <a:off x="9993594" y="3730196"/>
+            <a:ext cx="1371600" cy="1371600"/>
           </a:xfrm>
           <a:prstGeom prst="rect">
             <a:avLst/>
           </a:prstGeom>
-          <a:noFill/>
         </p:spPr>
-        <p:txBody>
-          <a:bodyPr wrap="square" rtlCol="0">
-            <a:spAutoFit/>
-          </a:bodyPr>
-          <a:lstStyle/>
-          <a:p>
-            <a:pPr fontAlgn="base"/>
-            <a:r>
-              <a:rPr lang="en-GB" dirty="0">
-                <a:solidFill>
-                  <a:schemeClr val="bg2">
-                    <a:lumMod val="50000"/>
-                  </a:schemeClr>
-                </a:solidFill>
-                <a:latin typeface="Anonymice Powerline" panose="02060609030202000504" pitchFamily="49" charset="0"/>
-                <a:ea typeface="Anonymice Powerline" panose="02060609030202000504" pitchFamily="49" charset="0"/>
-              </a:rPr>
-              <a:t>Zero crossing rate</a:t>
-            </a:r>
-          </a:p>
-          <a:p>
-            <a:pPr fontAlgn="base"/>
-            <a:r>
-              <a:rPr lang="en-GB" dirty="0">
-                <a:solidFill>
-                  <a:schemeClr val="bg2">
-                    <a:lumMod val="50000"/>
-                  </a:schemeClr>
-                </a:solidFill>
-                <a:latin typeface="Anonymice Powerline" panose="02060609030202000504" pitchFamily="49" charset="0"/>
-                <a:ea typeface="Anonymice Powerline" panose="02060609030202000504" pitchFamily="49" charset="0"/>
-              </a:rPr>
-              <a:t>Spectral centroid</a:t>
-            </a:r>
-          </a:p>
-          <a:p>
-            <a:pPr fontAlgn="base"/>
-            <a:r>
-              <a:rPr lang="en-GB" dirty="0">
-                <a:solidFill>
-                  <a:schemeClr val="bg2">
-                    <a:lumMod val="50000"/>
-                  </a:schemeClr>
-                </a:solidFill>
-                <a:latin typeface="Anonymice Powerline" panose="02060609030202000504" pitchFamily="49" charset="0"/>
-                <a:ea typeface="Anonymice Powerline" panose="02060609030202000504" pitchFamily="49" charset="0"/>
-              </a:rPr>
-              <a:t>Spectral bandwidth</a:t>
-            </a:r>
-          </a:p>
-          <a:p>
-            <a:pPr fontAlgn="base"/>
-            <a:r>
-              <a:rPr lang="en-GB" dirty="0">
-                <a:solidFill>
-                  <a:schemeClr val="bg2">
-                    <a:lumMod val="50000"/>
-                  </a:schemeClr>
-                </a:solidFill>
-                <a:latin typeface="Anonymice Powerline" panose="02060609030202000504" pitchFamily="49" charset="0"/>
-                <a:ea typeface="Anonymice Powerline" panose="02060609030202000504" pitchFamily="49" charset="0"/>
-              </a:rPr>
-              <a:t>Spectral </a:t>
-            </a:r>
-            <a:r>
-              <a:rPr lang="en-GB" dirty="0" err="1">
-                <a:solidFill>
-                  <a:schemeClr val="bg2">
-                    <a:lumMod val="50000"/>
-                  </a:schemeClr>
-                </a:solidFill>
-                <a:latin typeface="Anonymice Powerline" panose="02060609030202000504" pitchFamily="49" charset="0"/>
-                <a:ea typeface="Anonymice Powerline" panose="02060609030202000504" pitchFamily="49" charset="0"/>
-              </a:rPr>
-              <a:t>rolloff</a:t>
-            </a:r>
-            <a:endParaRPr lang="en-GB" dirty="0">
-              <a:solidFill>
-                <a:schemeClr val="bg2">
-                  <a:lumMod val="50000"/>
-                </a:schemeClr>
-              </a:solidFill>
-              <a:latin typeface="Anonymice Powerline" panose="02060609030202000504" pitchFamily="49" charset="0"/>
-              <a:ea typeface="Anonymice Powerline" panose="02060609030202000504" pitchFamily="49" charset="0"/>
-            </a:endParaRPr>
-          </a:p>
-          <a:p>
-            <a:endParaRPr lang="en-FR" dirty="0">
-              <a:solidFill>
-                <a:schemeClr val="bg2">
-                  <a:lumMod val="50000"/>
-                </a:schemeClr>
-              </a:solidFill>
-              <a:latin typeface="Anonymice Powerline" panose="02060609030202000504" pitchFamily="49" charset="0"/>
-              <a:ea typeface="Anonymice Powerline" panose="02060609030202000504" pitchFamily="49" charset="0"/>
-            </a:endParaRPr>
-          </a:p>
-        </p:txBody>
-      </p:sp>
-      <p:sp>
-        <p:nvSpPr>
-          <p:cNvPr id="37" name="TextBox 36">
-            <a:extLst>
-              <a:ext uri="{FF2B5EF4-FFF2-40B4-BE49-F238E27FC236}">
-                <a16:creationId xmlns:a16="http://schemas.microsoft.com/office/drawing/2014/main" id="{F4171DFA-1B37-694A-B8E7-8D17E4376E49}"/>
-              </a:ext>
-            </a:extLst>
-          </p:cNvPr>
-          <p:cNvSpPr txBox="1"/>
+      </p:pic>
+      <p:sp>
+        <p:nvSpPr>
+          <p:cNvPr id="38" name="Rectangle 37">
+            <a:extLst>
+              <a:ext uri="{FF2B5EF4-FFF2-40B4-BE49-F238E27FC236}">
+                <a16:creationId xmlns:a16="http://schemas.microsoft.com/office/drawing/2014/main" id="{3BF442B7-7308-2442-B23A-01A96C1D26C3}"/>
+              </a:ext>
+            </a:extLst>
+          </p:cNvPr>
+          <p:cNvSpPr/>
           <p:nvPr/>
         </p:nvSpPr>
         <p:spPr>
           <a:xfrm>
-            <a:off x="4496954" y="5027298"/>
-            <a:ext cx="4555153" cy="1754326"/>
+            <a:off x="9871217" y="5198144"/>
+            <a:ext cx="1491114" cy="369332"/>
           </a:xfrm>
           <a:prstGeom prst="rect">
             <a:avLst/>
           </a:prstGeom>
-          <a:noFill/>
         </p:spPr>
         <p:txBody>
-          <a:bodyPr wrap="square" rtlCol="0">
+          <a:bodyPr wrap="none">
             <a:spAutoFit/>
           </a:bodyPr>
           <a:lstStyle/>
           <a:p>
-            <a:pPr fontAlgn="base"/>
-            <a:r>
-              <a:rPr lang="en-GB" dirty="0">
-                <a:solidFill>
-                  <a:schemeClr val="bg2">
-                    <a:lumMod val="50000"/>
-                  </a:schemeClr>
-                </a:solidFill>
-                <a:latin typeface="Anonymice Powerline" panose="02060609030202000504" pitchFamily="49" charset="0"/>
-                <a:ea typeface="Anonymice Powerline" panose="02060609030202000504" pitchFamily="49" charset="0"/>
-              </a:rPr>
-              <a:t>Mel-Frequency Cepstral Coefficients</a:t>
-            </a:r>
-          </a:p>
-          <a:p>
-            <a:pPr fontAlgn="base"/>
-            <a:r>
-              <a:rPr lang="en-GB" dirty="0">
-                <a:solidFill>
-                  <a:schemeClr val="bg2">
-                    <a:lumMod val="50000"/>
-                  </a:schemeClr>
-                </a:solidFill>
-                <a:latin typeface="Anonymice Powerline" panose="02060609030202000504" pitchFamily="49" charset="0"/>
-                <a:ea typeface="Anonymice Powerline" panose="02060609030202000504" pitchFamily="49" charset="0"/>
-              </a:rPr>
-              <a:t>Chroma frequencies</a:t>
-            </a:r>
-          </a:p>
-          <a:p>
-            <a:pPr fontAlgn="base"/>
-            <a:r>
-              <a:rPr lang="en-GB" dirty="0">
-                <a:solidFill>
-                  <a:schemeClr val="bg2">
-                    <a:lumMod val="50000"/>
-                  </a:schemeClr>
-                </a:solidFill>
-                <a:latin typeface="Anonymice Powerline" panose="02060609030202000504" pitchFamily="49" charset="0"/>
-                <a:ea typeface="Anonymice Powerline" panose="02060609030202000504" pitchFamily="49" charset="0"/>
-              </a:rPr>
-              <a:t>RMSE (Root Mean Square Energy)</a:t>
-            </a:r>
-          </a:p>
-          <a:p>
-            <a:pPr fontAlgn="base"/>
-            <a:r>
-              <a:rPr lang="en-GB" dirty="0">
-                <a:solidFill>
-                  <a:schemeClr val="bg2">
-                    <a:lumMod val="50000"/>
-                  </a:schemeClr>
-                </a:solidFill>
-                <a:latin typeface="Anonymice Powerline" panose="02060609030202000504" pitchFamily="49" charset="0"/>
-                <a:ea typeface="Anonymice Powerline" panose="02060609030202000504" pitchFamily="49" charset="0"/>
-              </a:rPr>
-              <a:t>Etc…</a:t>
-            </a:r>
-          </a:p>
-          <a:p>
-            <a:endParaRPr lang="en-FR" dirty="0">
-              <a:latin typeface="Anonymice Powerline" panose="02060609030202000504" pitchFamily="49" charset="0"/>
-              <a:ea typeface="Anonymice Powerline" panose="02060609030202000504" pitchFamily="49" charset="0"/>
-            </a:endParaRPr>
+            <a:pPr algn="ctr"/>
+            <a:r>
+              <a:rPr lang="en-GB" dirty="0" err="1"/>
+              <a:t>hiphop</a:t>
+            </a:r>
+            <a:r>
+              <a:rPr lang="en-FR" dirty="0"/>
+              <a:t>02.png</a:t>
+            </a:r>
           </a:p>
         </p:txBody>
       </p:sp>

</xml_diff>

<commit_message>
Addded Feature Extraction CSV_V2
</commit_message>
<xml_diff>
--- a/docs/DocumentationFigures.pptx
+++ b/docs/DocumentationFigures.pptx
@@ -5,10 +5,12 @@
     <p:sldMasterId id="2147483648" r:id="rId1"/>
   </p:sldMasterIdLst>
   <p:notesMasterIdLst>
-    <p:notesMasterId r:id="rId3"/>
+    <p:notesMasterId r:id="rId5"/>
   </p:notesMasterIdLst>
   <p:sldIdLst>
     <p:sldId id="256" r:id="rId2"/>
+    <p:sldId id="258" r:id="rId3"/>
+    <p:sldId id="259" r:id="rId4"/>
   </p:sldIdLst>
   <p:sldSz cx="12192000" cy="6858000"/>
   <p:notesSz cx="6858000" cy="9144000"/>
@@ -197,7 +199,7 @@
           <a:p>
             <a:fld id="{07372395-1345-5242-86C8-8BFA020EFA0E}" type="datetimeFigureOut">
               <a:rPr lang="en-FR" smtClean="0"/>
-              <a:t>11/02/2021</a:t>
+              <a:t>18/02/2021</a:t>
             </a:fld>
             <a:endParaRPr lang="en-FR"/>
           </a:p>
@@ -549,6 +551,174 @@
 </p:notes>
 </file>
 
+<file path=ppt/notesSlides/notesSlide2.xml><?xml version="1.0" encoding="utf-8"?>
+<p:notes xmlns:a="http://schemas.openxmlformats.org/drawingml/2006/main" xmlns:r="http://schemas.openxmlformats.org/officeDocument/2006/relationships" xmlns:p="http://schemas.openxmlformats.org/presentationml/2006/main">
+  <p:cSld>
+    <p:spTree>
+      <p:nvGrpSpPr>
+        <p:cNvPr id="1" name=""/>
+        <p:cNvGrpSpPr/>
+        <p:nvPr/>
+      </p:nvGrpSpPr>
+      <p:grpSpPr>
+        <a:xfrm>
+          <a:off x="0" y="0"/>
+          <a:ext cx="0" cy="0"/>
+          <a:chOff x="0" y="0"/>
+          <a:chExt cx="0" cy="0"/>
+        </a:xfrm>
+      </p:grpSpPr>
+      <p:sp>
+        <p:nvSpPr>
+          <p:cNvPr id="2" name="Slide Image Placeholder 1"/>
+          <p:cNvSpPr>
+            <a:spLocks noGrp="1" noRot="1" noChangeAspect="1"/>
+          </p:cNvSpPr>
+          <p:nvPr>
+            <p:ph type="sldImg"/>
+          </p:nvPr>
+        </p:nvSpPr>
+        <p:spPr/>
+      </p:sp>
+      <p:sp>
+        <p:nvSpPr>
+          <p:cNvPr id="3" name="Notes Placeholder 2"/>
+          <p:cNvSpPr>
+            <a:spLocks noGrp="1"/>
+          </p:cNvSpPr>
+          <p:nvPr>
+            <p:ph type="body" idx="1"/>
+          </p:nvPr>
+        </p:nvSpPr>
+        <p:spPr/>
+        <p:txBody>
+          <a:bodyPr/>
+          <a:lstStyle/>
+          <a:p>
+            <a:endParaRPr lang="en-FR" dirty="0"/>
+          </a:p>
+        </p:txBody>
+      </p:sp>
+      <p:sp>
+        <p:nvSpPr>
+          <p:cNvPr id="4" name="Slide Number Placeholder 3"/>
+          <p:cNvSpPr>
+            <a:spLocks noGrp="1"/>
+          </p:cNvSpPr>
+          <p:nvPr>
+            <p:ph type="sldNum" sz="quarter" idx="5"/>
+          </p:nvPr>
+        </p:nvSpPr>
+        <p:spPr/>
+        <p:txBody>
+          <a:bodyPr/>
+          <a:lstStyle/>
+          <a:p>
+            <a:fld id="{3D527973-9C1D-8D48-8832-8644C23AAA6A}" type="slidenum">
+              <a:rPr lang="en-FR" smtClean="0"/>
+              <a:t>2</a:t>
+            </a:fld>
+            <a:endParaRPr lang="en-FR"/>
+          </a:p>
+        </p:txBody>
+      </p:sp>
+    </p:spTree>
+    <p:extLst>
+      <p:ext uri="{BB962C8B-B14F-4D97-AF65-F5344CB8AC3E}">
+        <p14:creationId xmlns:p14="http://schemas.microsoft.com/office/powerpoint/2010/main" val="1622365209"/>
+      </p:ext>
+    </p:extLst>
+  </p:cSld>
+  <p:clrMapOvr>
+    <a:masterClrMapping/>
+  </p:clrMapOvr>
+</p:notes>
+</file>
+
+<file path=ppt/notesSlides/notesSlide3.xml><?xml version="1.0" encoding="utf-8"?>
+<p:notes xmlns:a="http://schemas.openxmlformats.org/drawingml/2006/main" xmlns:r="http://schemas.openxmlformats.org/officeDocument/2006/relationships" xmlns:p="http://schemas.openxmlformats.org/presentationml/2006/main">
+  <p:cSld>
+    <p:spTree>
+      <p:nvGrpSpPr>
+        <p:cNvPr id="1" name=""/>
+        <p:cNvGrpSpPr/>
+        <p:nvPr/>
+      </p:nvGrpSpPr>
+      <p:grpSpPr>
+        <a:xfrm>
+          <a:off x="0" y="0"/>
+          <a:ext cx="0" cy="0"/>
+          <a:chOff x="0" y="0"/>
+          <a:chExt cx="0" cy="0"/>
+        </a:xfrm>
+      </p:grpSpPr>
+      <p:sp>
+        <p:nvSpPr>
+          <p:cNvPr id="2" name="Slide Image Placeholder 1"/>
+          <p:cNvSpPr>
+            <a:spLocks noGrp="1" noRot="1" noChangeAspect="1"/>
+          </p:cNvSpPr>
+          <p:nvPr>
+            <p:ph type="sldImg"/>
+          </p:nvPr>
+        </p:nvSpPr>
+        <p:spPr/>
+      </p:sp>
+      <p:sp>
+        <p:nvSpPr>
+          <p:cNvPr id="3" name="Notes Placeholder 2"/>
+          <p:cNvSpPr>
+            <a:spLocks noGrp="1"/>
+          </p:cNvSpPr>
+          <p:nvPr>
+            <p:ph type="body" idx="1"/>
+          </p:nvPr>
+        </p:nvSpPr>
+        <p:spPr/>
+        <p:txBody>
+          <a:bodyPr/>
+          <a:lstStyle/>
+          <a:p>
+            <a:endParaRPr lang="en-FR" dirty="0"/>
+          </a:p>
+        </p:txBody>
+      </p:sp>
+      <p:sp>
+        <p:nvSpPr>
+          <p:cNvPr id="4" name="Slide Number Placeholder 3"/>
+          <p:cNvSpPr>
+            <a:spLocks noGrp="1"/>
+          </p:cNvSpPr>
+          <p:nvPr>
+            <p:ph type="sldNum" sz="quarter" idx="5"/>
+          </p:nvPr>
+        </p:nvSpPr>
+        <p:spPr/>
+        <p:txBody>
+          <a:bodyPr/>
+          <a:lstStyle/>
+          <a:p>
+            <a:fld id="{3D527973-9C1D-8D48-8832-8644C23AAA6A}" type="slidenum">
+              <a:rPr lang="en-FR" smtClean="0"/>
+              <a:t>3</a:t>
+            </a:fld>
+            <a:endParaRPr lang="en-FR"/>
+          </a:p>
+        </p:txBody>
+      </p:sp>
+    </p:spTree>
+    <p:extLst>
+      <p:ext uri="{BB962C8B-B14F-4D97-AF65-F5344CB8AC3E}">
+        <p14:creationId xmlns:p14="http://schemas.microsoft.com/office/powerpoint/2010/main" val="3878623092"/>
+      </p:ext>
+    </p:extLst>
+  </p:cSld>
+  <p:clrMapOvr>
+    <a:masterClrMapping/>
+  </p:clrMapOvr>
+</p:notes>
+</file>
+
 <file path=ppt/slideLayouts/slideLayout1.xml><?xml version="1.0" encoding="utf-8"?>
 <p:sldLayout xmlns:a="http://schemas.openxmlformats.org/drawingml/2006/main" xmlns:r="http://schemas.openxmlformats.org/officeDocument/2006/relationships" xmlns:p="http://schemas.openxmlformats.org/presentationml/2006/main" type="title" preserve="1">
   <p:cSld name="Title Slide">
@@ -698,7 +868,7 @@
           <a:p>
             <a:fld id="{33CC349A-D6B2-9444-83E9-E05BA33BD8A1}" type="datetimeFigureOut">
               <a:rPr lang="en-FR" smtClean="0"/>
-              <a:t>11/02/2021</a:t>
+              <a:t>18/02/2021</a:t>
             </a:fld>
             <a:endParaRPr lang="en-FR"/>
           </a:p>
@@ -898,7 +1068,7 @@
           <a:p>
             <a:fld id="{33CC349A-D6B2-9444-83E9-E05BA33BD8A1}" type="datetimeFigureOut">
               <a:rPr lang="en-FR" smtClean="0"/>
-              <a:t>11/02/2021</a:t>
+              <a:t>18/02/2021</a:t>
             </a:fld>
             <a:endParaRPr lang="en-FR"/>
           </a:p>
@@ -1108,7 +1278,7 @@
           <a:p>
             <a:fld id="{33CC349A-D6B2-9444-83E9-E05BA33BD8A1}" type="datetimeFigureOut">
               <a:rPr lang="en-FR" smtClean="0"/>
-              <a:t>11/02/2021</a:t>
+              <a:t>18/02/2021</a:t>
             </a:fld>
             <a:endParaRPr lang="en-FR"/>
           </a:p>
@@ -1308,7 +1478,7 @@
           <a:p>
             <a:fld id="{33CC349A-D6B2-9444-83E9-E05BA33BD8A1}" type="datetimeFigureOut">
               <a:rPr lang="en-FR" smtClean="0"/>
-              <a:t>11/02/2021</a:t>
+              <a:t>18/02/2021</a:t>
             </a:fld>
             <a:endParaRPr lang="en-FR"/>
           </a:p>
@@ -1584,7 +1754,7 @@
           <a:p>
             <a:fld id="{33CC349A-D6B2-9444-83E9-E05BA33BD8A1}" type="datetimeFigureOut">
               <a:rPr lang="en-FR" smtClean="0"/>
-              <a:t>11/02/2021</a:t>
+              <a:t>18/02/2021</a:t>
             </a:fld>
             <a:endParaRPr lang="en-FR"/>
           </a:p>
@@ -1852,7 +2022,7 @@
           <a:p>
             <a:fld id="{33CC349A-D6B2-9444-83E9-E05BA33BD8A1}" type="datetimeFigureOut">
               <a:rPr lang="en-FR" smtClean="0"/>
-              <a:t>11/02/2021</a:t>
+              <a:t>18/02/2021</a:t>
             </a:fld>
             <a:endParaRPr lang="en-FR"/>
           </a:p>
@@ -2267,7 +2437,7 @@
           <a:p>
             <a:fld id="{33CC349A-D6B2-9444-83E9-E05BA33BD8A1}" type="datetimeFigureOut">
               <a:rPr lang="en-FR" smtClean="0"/>
-              <a:t>11/02/2021</a:t>
+              <a:t>18/02/2021</a:t>
             </a:fld>
             <a:endParaRPr lang="en-FR"/>
           </a:p>
@@ -2409,7 +2579,7 @@
           <a:p>
             <a:fld id="{33CC349A-D6B2-9444-83E9-E05BA33BD8A1}" type="datetimeFigureOut">
               <a:rPr lang="en-FR" smtClean="0"/>
-              <a:t>11/02/2021</a:t>
+              <a:t>18/02/2021</a:t>
             </a:fld>
             <a:endParaRPr lang="en-FR"/>
           </a:p>
@@ -2522,7 +2692,7 @@
           <a:p>
             <a:fld id="{33CC349A-D6B2-9444-83E9-E05BA33BD8A1}" type="datetimeFigureOut">
               <a:rPr lang="en-FR" smtClean="0"/>
-              <a:t>11/02/2021</a:t>
+              <a:t>18/02/2021</a:t>
             </a:fld>
             <a:endParaRPr lang="en-FR"/>
           </a:p>
@@ -2835,7 +3005,7 @@
           <a:p>
             <a:fld id="{33CC349A-D6B2-9444-83E9-E05BA33BD8A1}" type="datetimeFigureOut">
               <a:rPr lang="en-FR" smtClean="0"/>
-              <a:t>11/02/2021</a:t>
+              <a:t>18/02/2021</a:t>
             </a:fld>
             <a:endParaRPr lang="en-FR"/>
           </a:p>
@@ -3124,7 +3294,7 @@
           <a:p>
             <a:fld id="{33CC349A-D6B2-9444-83E9-E05BA33BD8A1}" type="datetimeFigureOut">
               <a:rPr lang="en-FR" smtClean="0"/>
-              <a:t>11/02/2021</a:t>
+              <a:t>18/02/2021</a:t>
             </a:fld>
             <a:endParaRPr lang="en-FR"/>
           </a:p>
@@ -3367,7 +3537,7 @@
           <a:p>
             <a:fld id="{33CC349A-D6B2-9444-83E9-E05BA33BD8A1}" type="datetimeFigureOut">
               <a:rPr lang="en-FR" smtClean="0"/>
-              <a:t>11/02/2021</a:t>
+              <a:t>18/02/2021</a:t>
             </a:fld>
             <a:endParaRPr lang="en-FR"/>
           </a:p>
@@ -4995,6 +5165,2726 @@
     <p:extLst>
       <p:ext uri="{BB962C8B-B14F-4D97-AF65-F5344CB8AC3E}">
         <p14:creationId xmlns:p14="http://schemas.microsoft.com/office/powerpoint/2010/main" val="1267594703"/>
+      </p:ext>
+    </p:extLst>
+  </p:cSld>
+  <p:clrMapOvr>
+    <a:masterClrMapping/>
+  </p:clrMapOvr>
+</p:sld>
+</file>
+
+<file path=ppt/slides/slide2.xml><?xml version="1.0" encoding="utf-8"?>
+<p:sld xmlns:a="http://schemas.openxmlformats.org/drawingml/2006/main" xmlns:r="http://schemas.openxmlformats.org/officeDocument/2006/relationships" xmlns:p="http://schemas.openxmlformats.org/presentationml/2006/main">
+  <p:cSld>
+    <p:spTree>
+      <p:nvGrpSpPr>
+        <p:cNvPr id="1" name=""/>
+        <p:cNvGrpSpPr/>
+        <p:nvPr/>
+      </p:nvGrpSpPr>
+      <p:grpSpPr>
+        <a:xfrm>
+          <a:off x="0" y="0"/>
+          <a:ext cx="0" cy="0"/>
+          <a:chOff x="0" y="0"/>
+          <a:chExt cx="0" cy="0"/>
+        </a:xfrm>
+      </p:grpSpPr>
+      <p:sp>
+        <p:nvSpPr>
+          <p:cNvPr id="4" name="TextBox 3">
+            <a:extLst>
+              <a:ext uri="{FF2B5EF4-FFF2-40B4-BE49-F238E27FC236}">
+                <a16:creationId xmlns:a16="http://schemas.microsoft.com/office/drawing/2014/main" id="{4C2210E9-A828-614B-B551-24EC7B6BE3E8}"/>
+              </a:ext>
+            </a:extLst>
+          </p:cNvPr>
+          <p:cNvSpPr txBox="1"/>
+          <p:nvPr/>
+        </p:nvSpPr>
+        <p:spPr>
+          <a:xfrm>
+            <a:off x="747251" y="292177"/>
+            <a:ext cx="2145323" cy="369332"/>
+          </a:xfrm>
+          <a:prstGeom prst="rect">
+            <a:avLst/>
+          </a:prstGeom>
+          <a:noFill/>
+        </p:spPr>
+        <p:txBody>
+          <a:bodyPr wrap="square" rtlCol="0">
+            <a:spAutoFit/>
+          </a:bodyPr>
+          <a:lstStyle/>
+          <a:p>
+            <a:r>
+              <a:rPr lang="en-FR" dirty="0"/>
+              <a:t>1000 MP3 Files</a:t>
+            </a:r>
+          </a:p>
+        </p:txBody>
+      </p:sp>
+      <p:sp>
+        <p:nvSpPr>
+          <p:cNvPr id="6" name="Rounded Rectangle 5">
+            <a:extLst>
+              <a:ext uri="{FF2B5EF4-FFF2-40B4-BE49-F238E27FC236}">
+                <a16:creationId xmlns:a16="http://schemas.microsoft.com/office/drawing/2014/main" id="{25433829-715F-5A4E-AE89-873068402FE4}"/>
+              </a:ext>
+            </a:extLst>
+          </p:cNvPr>
+          <p:cNvSpPr/>
+          <p:nvPr/>
+        </p:nvSpPr>
+        <p:spPr>
+          <a:xfrm>
+            <a:off x="345642" y="1822253"/>
+            <a:ext cx="2643743" cy="496530"/>
+          </a:xfrm>
+          <a:prstGeom prst="roundRect">
+            <a:avLst/>
+          </a:prstGeom>
+        </p:spPr>
+        <p:style>
+          <a:lnRef idx="2">
+            <a:schemeClr val="accent1">
+              <a:shade val="50000"/>
+            </a:schemeClr>
+          </a:lnRef>
+          <a:fillRef idx="1">
+            <a:schemeClr val="accent1"/>
+          </a:fillRef>
+          <a:effectRef idx="0">
+            <a:schemeClr val="accent1"/>
+          </a:effectRef>
+          <a:fontRef idx="minor">
+            <a:schemeClr val="lt1"/>
+          </a:fontRef>
+        </p:style>
+        <p:txBody>
+          <a:bodyPr rtlCol="0" anchor="ctr"/>
+          <a:lstStyle/>
+          <a:p>
+            <a:pPr algn="ctr"/>
+            <a:r>
+              <a:rPr lang="en-GB" dirty="0"/>
+              <a:t>b</a:t>
+            </a:r>
+            <a:r>
+              <a:rPr lang="en-FR" dirty="0"/>
+              <a:t>lues01.mp3</a:t>
+            </a:r>
+          </a:p>
+        </p:txBody>
+      </p:sp>
+      <p:pic>
+        <p:nvPicPr>
+          <p:cNvPr id="9" name="Picture 8">
+            <a:extLst>
+              <a:ext uri="{FF2B5EF4-FFF2-40B4-BE49-F238E27FC236}">
+                <a16:creationId xmlns:a16="http://schemas.microsoft.com/office/drawing/2014/main" id="{5C2F5C08-54F6-0C43-97B9-E0B95E1931FC}"/>
+              </a:ext>
+            </a:extLst>
+          </p:cNvPr>
+          <p:cNvPicPr>
+            <a:picLocks noChangeAspect="1"/>
+          </p:cNvPicPr>
+          <p:nvPr/>
+        </p:nvPicPr>
+        <p:blipFill>
+          <a:blip r:embed="rId3"/>
+          <a:stretch>
+            <a:fillRect/>
+          </a:stretch>
+        </p:blipFill>
+        <p:spPr>
+          <a:xfrm>
+            <a:off x="345642" y="1822253"/>
+            <a:ext cx="620663" cy="496530"/>
+          </a:xfrm>
+          <a:prstGeom prst="rect">
+            <a:avLst/>
+          </a:prstGeom>
+        </p:spPr>
+      </p:pic>
+      <p:sp>
+        <p:nvSpPr>
+          <p:cNvPr id="10" name="Rounded Rectangle 9">
+            <a:extLst>
+              <a:ext uri="{FF2B5EF4-FFF2-40B4-BE49-F238E27FC236}">
+                <a16:creationId xmlns:a16="http://schemas.microsoft.com/office/drawing/2014/main" id="{FD474DDD-02A1-8A4E-A70F-3B723BF3AF5D}"/>
+              </a:ext>
+            </a:extLst>
+          </p:cNvPr>
+          <p:cNvSpPr/>
+          <p:nvPr/>
+        </p:nvSpPr>
+        <p:spPr>
+          <a:xfrm>
+            <a:off x="345642" y="2603918"/>
+            <a:ext cx="2643743" cy="496530"/>
+          </a:xfrm>
+          <a:prstGeom prst="roundRect">
+            <a:avLst/>
+          </a:prstGeom>
+          <a:solidFill>
+            <a:schemeClr val="accent2"/>
+          </a:solidFill>
+        </p:spPr>
+        <p:style>
+          <a:lnRef idx="2">
+            <a:schemeClr val="accent1">
+              <a:shade val="50000"/>
+            </a:schemeClr>
+          </a:lnRef>
+          <a:fillRef idx="1">
+            <a:schemeClr val="accent1"/>
+          </a:fillRef>
+          <a:effectRef idx="0">
+            <a:schemeClr val="accent1"/>
+          </a:effectRef>
+          <a:fontRef idx="minor">
+            <a:schemeClr val="lt1"/>
+          </a:fontRef>
+        </p:style>
+        <p:txBody>
+          <a:bodyPr rtlCol="0" anchor="ctr"/>
+          <a:lstStyle/>
+          <a:p>
+            <a:pPr algn="ctr"/>
+            <a:r>
+              <a:rPr lang="fr-FR" dirty="0"/>
+              <a:t>rock</a:t>
+            </a:r>
+            <a:r>
+              <a:rPr lang="en-FR" dirty="0"/>
+              <a:t>12.mp3</a:t>
+            </a:r>
+          </a:p>
+        </p:txBody>
+      </p:sp>
+      <p:pic>
+        <p:nvPicPr>
+          <p:cNvPr id="11" name="Picture 10">
+            <a:extLst>
+              <a:ext uri="{FF2B5EF4-FFF2-40B4-BE49-F238E27FC236}">
+                <a16:creationId xmlns:a16="http://schemas.microsoft.com/office/drawing/2014/main" id="{3D055D8F-CA9B-FB48-8B2B-DDDE5C3A1A4D}"/>
+              </a:ext>
+            </a:extLst>
+          </p:cNvPr>
+          <p:cNvPicPr>
+            <a:picLocks noChangeAspect="1"/>
+          </p:cNvPicPr>
+          <p:nvPr/>
+        </p:nvPicPr>
+        <p:blipFill>
+          <a:blip r:embed="rId3"/>
+          <a:stretch>
+            <a:fillRect/>
+          </a:stretch>
+        </p:blipFill>
+        <p:spPr>
+          <a:xfrm>
+            <a:off x="345642" y="2603918"/>
+            <a:ext cx="620663" cy="496530"/>
+          </a:xfrm>
+          <a:prstGeom prst="rect">
+            <a:avLst/>
+          </a:prstGeom>
+        </p:spPr>
+      </p:pic>
+      <p:sp>
+        <p:nvSpPr>
+          <p:cNvPr id="12" name="Rounded Rectangle 11">
+            <a:extLst>
+              <a:ext uri="{FF2B5EF4-FFF2-40B4-BE49-F238E27FC236}">
+                <a16:creationId xmlns:a16="http://schemas.microsoft.com/office/drawing/2014/main" id="{0B4B074D-CF2B-1749-9275-91C60DE75FC1}"/>
+              </a:ext>
+            </a:extLst>
+          </p:cNvPr>
+          <p:cNvSpPr/>
+          <p:nvPr/>
+        </p:nvSpPr>
+        <p:spPr>
+          <a:xfrm>
+            <a:off x="345642" y="3385583"/>
+            <a:ext cx="2643743" cy="496530"/>
+          </a:xfrm>
+          <a:prstGeom prst="roundRect">
+            <a:avLst/>
+          </a:prstGeom>
+          <a:solidFill>
+            <a:srgbClr val="7030A0"/>
+          </a:solidFill>
+        </p:spPr>
+        <p:style>
+          <a:lnRef idx="2">
+            <a:schemeClr val="accent1">
+              <a:shade val="50000"/>
+            </a:schemeClr>
+          </a:lnRef>
+          <a:fillRef idx="1">
+            <a:schemeClr val="accent1"/>
+          </a:fillRef>
+          <a:effectRef idx="0">
+            <a:schemeClr val="accent1"/>
+          </a:effectRef>
+          <a:fontRef idx="minor">
+            <a:schemeClr val="lt1"/>
+          </a:fontRef>
+        </p:style>
+        <p:txBody>
+          <a:bodyPr rtlCol="0" anchor="ctr"/>
+          <a:lstStyle/>
+          <a:p>
+            <a:pPr algn="ctr"/>
+            <a:r>
+              <a:rPr lang="fr-FR" dirty="0"/>
+              <a:t>hiphop</a:t>
+            </a:r>
+            <a:r>
+              <a:rPr lang="en-FR" dirty="0"/>
+              <a:t>02.mp3</a:t>
+            </a:r>
+          </a:p>
+        </p:txBody>
+      </p:sp>
+      <p:pic>
+        <p:nvPicPr>
+          <p:cNvPr id="13" name="Picture 12">
+            <a:extLst>
+              <a:ext uri="{FF2B5EF4-FFF2-40B4-BE49-F238E27FC236}">
+                <a16:creationId xmlns:a16="http://schemas.microsoft.com/office/drawing/2014/main" id="{829ED377-0470-4C43-AC8A-965C7EC718BF}"/>
+              </a:ext>
+            </a:extLst>
+          </p:cNvPr>
+          <p:cNvPicPr>
+            <a:picLocks noChangeAspect="1"/>
+          </p:cNvPicPr>
+          <p:nvPr/>
+        </p:nvPicPr>
+        <p:blipFill>
+          <a:blip r:embed="rId3"/>
+          <a:stretch>
+            <a:fillRect/>
+          </a:stretch>
+        </p:blipFill>
+        <p:spPr>
+          <a:xfrm>
+            <a:off x="345642" y="3385583"/>
+            <a:ext cx="620663" cy="496530"/>
+          </a:xfrm>
+          <a:prstGeom prst="rect">
+            <a:avLst/>
+          </a:prstGeom>
+        </p:spPr>
+      </p:pic>
+      <p:sp>
+        <p:nvSpPr>
+          <p:cNvPr id="16" name="Rounded Rectangle 15">
+            <a:extLst>
+              <a:ext uri="{FF2B5EF4-FFF2-40B4-BE49-F238E27FC236}">
+                <a16:creationId xmlns:a16="http://schemas.microsoft.com/office/drawing/2014/main" id="{95890EC4-7188-E944-AE11-AD0C0B88ECA6}"/>
+              </a:ext>
+            </a:extLst>
+          </p:cNvPr>
+          <p:cNvSpPr/>
+          <p:nvPr/>
+        </p:nvSpPr>
+        <p:spPr>
+          <a:xfrm>
+            <a:off x="345642" y="4571998"/>
+            <a:ext cx="2643743" cy="496530"/>
+          </a:xfrm>
+          <a:prstGeom prst="roundRect">
+            <a:avLst/>
+          </a:prstGeom>
+          <a:solidFill>
+            <a:schemeClr val="accent2"/>
+          </a:solidFill>
+        </p:spPr>
+        <p:style>
+          <a:lnRef idx="2">
+            <a:schemeClr val="accent1">
+              <a:shade val="50000"/>
+            </a:schemeClr>
+          </a:lnRef>
+          <a:fillRef idx="1">
+            <a:schemeClr val="accent1"/>
+          </a:fillRef>
+          <a:effectRef idx="0">
+            <a:schemeClr val="accent1"/>
+          </a:effectRef>
+          <a:fontRef idx="minor">
+            <a:schemeClr val="lt1"/>
+          </a:fontRef>
+        </p:style>
+        <p:txBody>
+          <a:bodyPr rtlCol="0" anchor="ctr"/>
+          <a:lstStyle/>
+          <a:p>
+            <a:pPr algn="ctr"/>
+            <a:r>
+              <a:rPr lang="fr-FR" dirty="0"/>
+              <a:t>rock</a:t>
+            </a:r>
+            <a:r>
+              <a:rPr lang="en-FR" dirty="0"/>
+              <a:t>13.mp3</a:t>
+            </a:r>
+          </a:p>
+        </p:txBody>
+      </p:sp>
+      <p:pic>
+        <p:nvPicPr>
+          <p:cNvPr id="17" name="Picture 16">
+            <a:extLst>
+              <a:ext uri="{FF2B5EF4-FFF2-40B4-BE49-F238E27FC236}">
+                <a16:creationId xmlns:a16="http://schemas.microsoft.com/office/drawing/2014/main" id="{0F053492-B0DC-A54F-9DDB-9617F853F968}"/>
+              </a:ext>
+            </a:extLst>
+          </p:cNvPr>
+          <p:cNvPicPr>
+            <a:picLocks noChangeAspect="1"/>
+          </p:cNvPicPr>
+          <p:nvPr/>
+        </p:nvPicPr>
+        <p:blipFill>
+          <a:blip r:embed="rId3"/>
+          <a:stretch>
+            <a:fillRect/>
+          </a:stretch>
+        </p:blipFill>
+        <p:spPr>
+          <a:xfrm>
+            <a:off x="345642" y="4571998"/>
+            <a:ext cx="620663" cy="496530"/>
+          </a:xfrm>
+          <a:prstGeom prst="rect">
+            <a:avLst/>
+          </a:prstGeom>
+        </p:spPr>
+      </p:pic>
+      <p:sp>
+        <p:nvSpPr>
+          <p:cNvPr id="18" name="Rounded Rectangle 17">
+            <a:extLst>
+              <a:ext uri="{FF2B5EF4-FFF2-40B4-BE49-F238E27FC236}">
+                <a16:creationId xmlns:a16="http://schemas.microsoft.com/office/drawing/2014/main" id="{B603CC13-0E19-FC4B-AE05-5AA80C0095BD}"/>
+              </a:ext>
+            </a:extLst>
+          </p:cNvPr>
+          <p:cNvSpPr/>
+          <p:nvPr/>
+        </p:nvSpPr>
+        <p:spPr>
+          <a:xfrm>
+            <a:off x="345642" y="5351203"/>
+            <a:ext cx="2643743" cy="496530"/>
+          </a:xfrm>
+          <a:prstGeom prst="roundRect">
+            <a:avLst/>
+          </a:prstGeom>
+          <a:solidFill>
+            <a:schemeClr val="accent2"/>
+          </a:solidFill>
+        </p:spPr>
+        <p:style>
+          <a:lnRef idx="2">
+            <a:schemeClr val="accent1">
+              <a:shade val="50000"/>
+            </a:schemeClr>
+          </a:lnRef>
+          <a:fillRef idx="1">
+            <a:schemeClr val="accent1"/>
+          </a:fillRef>
+          <a:effectRef idx="0">
+            <a:schemeClr val="accent1"/>
+          </a:effectRef>
+          <a:fontRef idx="minor">
+            <a:schemeClr val="lt1"/>
+          </a:fontRef>
+        </p:style>
+        <p:txBody>
+          <a:bodyPr rtlCol="0" anchor="ctr"/>
+          <a:lstStyle/>
+          <a:p>
+            <a:pPr algn="ctr"/>
+            <a:r>
+              <a:rPr lang="fr-FR" dirty="0"/>
+              <a:t>rock</a:t>
+            </a:r>
+            <a:r>
+              <a:rPr lang="en-FR" dirty="0"/>
+              <a:t>15.mp3</a:t>
+            </a:r>
+          </a:p>
+        </p:txBody>
+      </p:sp>
+      <p:pic>
+        <p:nvPicPr>
+          <p:cNvPr id="19" name="Picture 18">
+            <a:extLst>
+              <a:ext uri="{FF2B5EF4-FFF2-40B4-BE49-F238E27FC236}">
+                <a16:creationId xmlns:a16="http://schemas.microsoft.com/office/drawing/2014/main" id="{5E76314E-95D5-9E43-A892-F1FEE3366247}"/>
+              </a:ext>
+            </a:extLst>
+          </p:cNvPr>
+          <p:cNvPicPr>
+            <a:picLocks noChangeAspect="1"/>
+          </p:cNvPicPr>
+          <p:nvPr/>
+        </p:nvPicPr>
+        <p:blipFill>
+          <a:blip r:embed="rId3"/>
+          <a:stretch>
+            <a:fillRect/>
+          </a:stretch>
+        </p:blipFill>
+        <p:spPr>
+          <a:xfrm>
+            <a:off x="345642" y="5351203"/>
+            <a:ext cx="620663" cy="496530"/>
+          </a:xfrm>
+          <a:prstGeom prst="rect">
+            <a:avLst/>
+          </a:prstGeom>
+        </p:spPr>
+      </p:pic>
+      <p:sp>
+        <p:nvSpPr>
+          <p:cNvPr id="20" name="Rounded Rectangle 19">
+            <a:extLst>
+              <a:ext uri="{FF2B5EF4-FFF2-40B4-BE49-F238E27FC236}">
+                <a16:creationId xmlns:a16="http://schemas.microsoft.com/office/drawing/2014/main" id="{60E05B3E-0730-3C48-9554-6532C1C51D91}"/>
+              </a:ext>
+            </a:extLst>
+          </p:cNvPr>
+          <p:cNvSpPr/>
+          <p:nvPr/>
+        </p:nvSpPr>
+        <p:spPr>
+          <a:xfrm>
+            <a:off x="345642" y="6130408"/>
+            <a:ext cx="2643743" cy="496530"/>
+          </a:xfrm>
+          <a:prstGeom prst="roundRect">
+            <a:avLst/>
+          </a:prstGeom>
+        </p:spPr>
+        <p:style>
+          <a:lnRef idx="2">
+            <a:schemeClr val="accent1">
+              <a:shade val="50000"/>
+            </a:schemeClr>
+          </a:lnRef>
+          <a:fillRef idx="1">
+            <a:schemeClr val="accent1"/>
+          </a:fillRef>
+          <a:effectRef idx="0">
+            <a:schemeClr val="accent1"/>
+          </a:effectRef>
+          <a:fontRef idx="minor">
+            <a:schemeClr val="lt1"/>
+          </a:fontRef>
+        </p:style>
+        <p:txBody>
+          <a:bodyPr rtlCol="0" anchor="ctr"/>
+          <a:lstStyle/>
+          <a:p>
+            <a:pPr algn="ctr"/>
+            <a:r>
+              <a:rPr lang="en-GB" dirty="0"/>
+              <a:t>b</a:t>
+            </a:r>
+            <a:r>
+              <a:rPr lang="en-FR" dirty="0"/>
+              <a:t>lues01.mp3</a:t>
+            </a:r>
+          </a:p>
+        </p:txBody>
+      </p:sp>
+      <p:pic>
+        <p:nvPicPr>
+          <p:cNvPr id="21" name="Picture 20">
+            <a:extLst>
+              <a:ext uri="{FF2B5EF4-FFF2-40B4-BE49-F238E27FC236}">
+                <a16:creationId xmlns:a16="http://schemas.microsoft.com/office/drawing/2014/main" id="{ABBC87B6-5DD3-B14E-9D60-721FBF3206CF}"/>
+              </a:ext>
+            </a:extLst>
+          </p:cNvPr>
+          <p:cNvPicPr>
+            <a:picLocks noChangeAspect="1"/>
+          </p:cNvPicPr>
+          <p:nvPr/>
+        </p:nvPicPr>
+        <p:blipFill>
+          <a:blip r:embed="rId3"/>
+          <a:stretch>
+            <a:fillRect/>
+          </a:stretch>
+        </p:blipFill>
+        <p:spPr>
+          <a:xfrm>
+            <a:off x="345642" y="6130408"/>
+            <a:ext cx="620663" cy="496530"/>
+          </a:xfrm>
+          <a:prstGeom prst="rect">
+            <a:avLst/>
+          </a:prstGeom>
+        </p:spPr>
+      </p:pic>
+      <p:sp>
+        <p:nvSpPr>
+          <p:cNvPr id="23" name="Oval 22">
+            <a:extLst>
+              <a:ext uri="{FF2B5EF4-FFF2-40B4-BE49-F238E27FC236}">
+                <a16:creationId xmlns:a16="http://schemas.microsoft.com/office/drawing/2014/main" id="{A3681E18-476D-8242-9119-351FD5D9A1F8}"/>
+              </a:ext>
+            </a:extLst>
+          </p:cNvPr>
+          <p:cNvSpPr/>
+          <p:nvPr/>
+        </p:nvSpPr>
+        <p:spPr>
+          <a:xfrm>
+            <a:off x="1194337" y="4102510"/>
+            <a:ext cx="186813" cy="186813"/>
+          </a:xfrm>
+          <a:prstGeom prst="ellipse">
+            <a:avLst/>
+          </a:prstGeom>
+          <a:solidFill>
+            <a:schemeClr val="bg2">
+              <a:lumMod val="25000"/>
+            </a:schemeClr>
+          </a:solidFill>
+          <a:ln>
+            <a:noFill/>
+          </a:ln>
+        </p:spPr>
+        <p:style>
+          <a:lnRef idx="2">
+            <a:schemeClr val="accent1">
+              <a:shade val="50000"/>
+            </a:schemeClr>
+          </a:lnRef>
+          <a:fillRef idx="1">
+            <a:schemeClr val="accent1"/>
+          </a:fillRef>
+          <a:effectRef idx="0">
+            <a:schemeClr val="accent1"/>
+          </a:effectRef>
+          <a:fontRef idx="minor">
+            <a:schemeClr val="lt1"/>
+          </a:fontRef>
+        </p:style>
+        <p:txBody>
+          <a:bodyPr rtlCol="0" anchor="ctr"/>
+          <a:lstStyle/>
+          <a:p>
+            <a:pPr algn="ctr"/>
+            <a:endParaRPr lang="en-FR"/>
+          </a:p>
+        </p:txBody>
+      </p:sp>
+      <p:sp>
+        <p:nvSpPr>
+          <p:cNvPr id="24" name="Oval 23">
+            <a:extLst>
+              <a:ext uri="{FF2B5EF4-FFF2-40B4-BE49-F238E27FC236}">
+                <a16:creationId xmlns:a16="http://schemas.microsoft.com/office/drawing/2014/main" id="{C4BD558A-054A-D145-9F24-E57E184609A1}"/>
+              </a:ext>
+            </a:extLst>
+          </p:cNvPr>
+          <p:cNvSpPr/>
+          <p:nvPr/>
+        </p:nvSpPr>
+        <p:spPr>
+          <a:xfrm>
+            <a:off x="1527404" y="4102510"/>
+            <a:ext cx="186813" cy="186813"/>
+          </a:xfrm>
+          <a:prstGeom prst="ellipse">
+            <a:avLst/>
+          </a:prstGeom>
+          <a:solidFill>
+            <a:schemeClr val="bg2">
+              <a:lumMod val="25000"/>
+            </a:schemeClr>
+          </a:solidFill>
+          <a:ln>
+            <a:noFill/>
+          </a:ln>
+        </p:spPr>
+        <p:style>
+          <a:lnRef idx="2">
+            <a:schemeClr val="accent1">
+              <a:shade val="50000"/>
+            </a:schemeClr>
+          </a:lnRef>
+          <a:fillRef idx="1">
+            <a:schemeClr val="accent1"/>
+          </a:fillRef>
+          <a:effectRef idx="0">
+            <a:schemeClr val="accent1"/>
+          </a:effectRef>
+          <a:fontRef idx="minor">
+            <a:schemeClr val="lt1"/>
+          </a:fontRef>
+        </p:style>
+        <p:txBody>
+          <a:bodyPr rtlCol="0" anchor="ctr"/>
+          <a:lstStyle/>
+          <a:p>
+            <a:pPr algn="ctr"/>
+            <a:endParaRPr lang="en-FR"/>
+          </a:p>
+        </p:txBody>
+      </p:sp>
+      <p:sp>
+        <p:nvSpPr>
+          <p:cNvPr id="25" name="Oval 24">
+            <a:extLst>
+              <a:ext uri="{FF2B5EF4-FFF2-40B4-BE49-F238E27FC236}">
+                <a16:creationId xmlns:a16="http://schemas.microsoft.com/office/drawing/2014/main" id="{E192A3A3-732B-4141-90B4-5DBA2B208708}"/>
+              </a:ext>
+            </a:extLst>
+          </p:cNvPr>
+          <p:cNvSpPr/>
+          <p:nvPr/>
+        </p:nvSpPr>
+        <p:spPr>
+          <a:xfrm>
+            <a:off x="1819913" y="4095134"/>
+            <a:ext cx="186813" cy="186813"/>
+          </a:xfrm>
+          <a:prstGeom prst="ellipse">
+            <a:avLst/>
+          </a:prstGeom>
+          <a:solidFill>
+            <a:schemeClr val="bg2">
+              <a:lumMod val="25000"/>
+            </a:schemeClr>
+          </a:solidFill>
+          <a:ln>
+            <a:noFill/>
+          </a:ln>
+        </p:spPr>
+        <p:style>
+          <a:lnRef idx="2">
+            <a:schemeClr val="accent1">
+              <a:shade val="50000"/>
+            </a:schemeClr>
+          </a:lnRef>
+          <a:fillRef idx="1">
+            <a:schemeClr val="accent1"/>
+          </a:fillRef>
+          <a:effectRef idx="0">
+            <a:schemeClr val="accent1"/>
+          </a:effectRef>
+          <a:fontRef idx="minor">
+            <a:schemeClr val="lt1"/>
+          </a:fontRef>
+        </p:style>
+        <p:txBody>
+          <a:bodyPr rtlCol="0" anchor="ctr"/>
+          <a:lstStyle/>
+          <a:p>
+            <a:pPr algn="ctr"/>
+            <a:endParaRPr lang="en-FR"/>
+          </a:p>
+        </p:txBody>
+      </p:sp>
+      <p:sp>
+        <p:nvSpPr>
+          <p:cNvPr id="26" name="Right Arrow 25">
+            <a:extLst>
+              <a:ext uri="{FF2B5EF4-FFF2-40B4-BE49-F238E27FC236}">
+                <a16:creationId xmlns:a16="http://schemas.microsoft.com/office/drawing/2014/main" id="{00DA3D30-60B5-3744-B457-C1A576E6CD4D}"/>
+              </a:ext>
+            </a:extLst>
+          </p:cNvPr>
+          <p:cNvSpPr/>
+          <p:nvPr/>
+        </p:nvSpPr>
+        <p:spPr>
+          <a:xfrm>
+            <a:off x="4496954" y="3210399"/>
+            <a:ext cx="3665919" cy="1039595"/>
+          </a:xfrm>
+          <a:prstGeom prst="rightArrow">
+            <a:avLst/>
+          </a:prstGeom>
+          <a:solidFill>
+            <a:schemeClr val="accent3">
+              <a:lumMod val="60000"/>
+              <a:lumOff val="40000"/>
+            </a:schemeClr>
+          </a:solidFill>
+          <a:ln>
+            <a:noFill/>
+          </a:ln>
+        </p:spPr>
+        <p:style>
+          <a:lnRef idx="2">
+            <a:schemeClr val="accent1">
+              <a:shade val="50000"/>
+            </a:schemeClr>
+          </a:lnRef>
+          <a:fillRef idx="1">
+            <a:schemeClr val="accent1"/>
+          </a:fillRef>
+          <a:effectRef idx="0">
+            <a:schemeClr val="accent1"/>
+          </a:effectRef>
+          <a:fontRef idx="minor">
+            <a:schemeClr val="lt1"/>
+          </a:fontRef>
+        </p:style>
+        <p:txBody>
+          <a:bodyPr rtlCol="0" anchor="ctr"/>
+          <a:lstStyle/>
+          <a:p>
+            <a:pPr algn="ctr"/>
+            <a:r>
+              <a:rPr lang="en-FR" sz="2000" dirty="0">
+                <a:latin typeface="Helvetica" pitchFamily="2" charset="0"/>
+              </a:rPr>
+              <a:t>Feature Extraction</a:t>
+            </a:r>
+          </a:p>
+        </p:txBody>
+      </p:sp>
+      <p:pic>
+        <p:nvPicPr>
+          <p:cNvPr id="28" name="Graphic 27">
+            <a:extLst>
+              <a:ext uri="{FF2B5EF4-FFF2-40B4-BE49-F238E27FC236}">
+                <a16:creationId xmlns:a16="http://schemas.microsoft.com/office/drawing/2014/main" id="{3B1C52C4-E6E0-8E4D-8737-E6E2003BD2BD}"/>
+              </a:ext>
+            </a:extLst>
+          </p:cNvPr>
+          <p:cNvPicPr>
+            <a:picLocks noChangeAspect="1"/>
+          </p:cNvPicPr>
+          <p:nvPr/>
+        </p:nvPicPr>
+        <p:blipFill>
+          <a:blip r:embed="rId4">
+            <a:extLst>
+              <a:ext uri="{96DAC541-7B7A-43D3-8B79-37D633B846F1}">
+                <asvg:svgBlip xmlns:asvg="http://schemas.microsoft.com/office/drawing/2016/SVG/main" r:embed="rId5"/>
+              </a:ext>
+            </a:extLst>
+          </a:blip>
+          <a:stretch>
+            <a:fillRect/>
+          </a:stretch>
+        </p:blipFill>
+        <p:spPr>
+          <a:xfrm>
+            <a:off x="5017447" y="2491936"/>
+            <a:ext cx="1759973" cy="717026"/>
+          </a:xfrm>
+          <a:prstGeom prst="rect">
+            <a:avLst/>
+          </a:prstGeom>
+        </p:spPr>
+      </p:pic>
+      <p:pic>
+        <p:nvPicPr>
+          <p:cNvPr id="29" name="Picture 28">
+            <a:extLst>
+              <a:ext uri="{FF2B5EF4-FFF2-40B4-BE49-F238E27FC236}">
+                <a16:creationId xmlns:a16="http://schemas.microsoft.com/office/drawing/2014/main" id="{DEADEE16-C84C-4D47-BAC3-DDE5099F6863}"/>
+              </a:ext>
+            </a:extLst>
+          </p:cNvPr>
+          <p:cNvPicPr>
+            <a:picLocks noChangeAspect="1"/>
+          </p:cNvPicPr>
+          <p:nvPr/>
+        </p:nvPicPr>
+        <p:blipFill>
+          <a:blip r:embed="rId6"/>
+          <a:stretch>
+            <a:fillRect/>
+          </a:stretch>
+        </p:blipFill>
+        <p:spPr>
+          <a:xfrm>
+            <a:off x="4808666" y="4249994"/>
+            <a:ext cx="2142767" cy="721657"/>
+          </a:xfrm>
+          <a:prstGeom prst="rect">
+            <a:avLst/>
+          </a:prstGeom>
+        </p:spPr>
+      </p:pic>
+      <p:sp>
+        <p:nvSpPr>
+          <p:cNvPr id="31" name="Round Diagonal Corner of Rectangle 30">
+            <a:extLst>
+              <a:ext uri="{FF2B5EF4-FFF2-40B4-BE49-F238E27FC236}">
+                <a16:creationId xmlns:a16="http://schemas.microsoft.com/office/drawing/2014/main" id="{55B7A9C1-6EA2-1E41-A57A-445ED32AE37B}"/>
+              </a:ext>
+            </a:extLst>
+          </p:cNvPr>
+          <p:cNvSpPr/>
+          <p:nvPr/>
+        </p:nvSpPr>
+        <p:spPr>
+          <a:xfrm>
+            <a:off x="345642" y="859708"/>
+            <a:ext cx="2643743" cy="740199"/>
+          </a:xfrm>
+          <a:prstGeom prst="round2DiagRect">
+            <a:avLst>
+              <a:gd name="adj1" fmla="val 16667"/>
+              <a:gd name="adj2" fmla="val 0"/>
+            </a:avLst>
+          </a:prstGeom>
+          <a:solidFill>
+            <a:schemeClr val="bg2">
+              <a:lumMod val="90000"/>
+            </a:schemeClr>
+          </a:solidFill>
+          <a:ln>
+            <a:noFill/>
+          </a:ln>
+        </p:spPr>
+        <p:style>
+          <a:lnRef idx="2">
+            <a:schemeClr val="accent1">
+              <a:shade val="50000"/>
+            </a:schemeClr>
+          </a:lnRef>
+          <a:fillRef idx="1">
+            <a:schemeClr val="accent1"/>
+          </a:fillRef>
+          <a:effectRef idx="0">
+            <a:schemeClr val="accent1"/>
+          </a:effectRef>
+          <a:fontRef idx="minor">
+            <a:schemeClr val="lt1"/>
+          </a:fontRef>
+        </p:style>
+        <p:txBody>
+          <a:bodyPr rtlCol="0" anchor="ctr"/>
+          <a:lstStyle/>
+          <a:p>
+            <a:r>
+              <a:rPr lang="en-FR" sz="1200" dirty="0">
+                <a:solidFill>
+                  <a:schemeClr val="bg2">
+                    <a:lumMod val="50000"/>
+                  </a:schemeClr>
+                </a:solidFill>
+                <a:latin typeface="Verdana" panose="020B0604030504040204" pitchFamily="34" charset="0"/>
+                <a:ea typeface="Verdana" panose="020B0604030504040204" pitchFamily="34" charset="0"/>
+                <a:cs typeface="Verdana" panose="020B0604030504040204" pitchFamily="34" charset="0"/>
+              </a:rPr>
+              <a:t>10 music genres</a:t>
+            </a:r>
+          </a:p>
+          <a:p>
+            <a:r>
+              <a:rPr lang="en-FR" sz="1200" dirty="0">
+                <a:solidFill>
+                  <a:schemeClr val="bg2">
+                    <a:lumMod val="50000"/>
+                  </a:schemeClr>
+                </a:solidFill>
+                <a:latin typeface="Verdana" panose="020B0604030504040204" pitchFamily="34" charset="0"/>
+                <a:ea typeface="Verdana" panose="020B0604030504040204" pitchFamily="34" charset="0"/>
+                <a:cs typeface="Verdana" panose="020B0604030504040204" pitchFamily="34" charset="0"/>
+              </a:rPr>
+              <a:t>100 tracks by genre</a:t>
+            </a:r>
+          </a:p>
+          <a:p>
+            <a:r>
+              <a:rPr lang="en-FR" sz="1200" dirty="0">
+                <a:solidFill>
+                  <a:schemeClr val="bg2">
+                    <a:lumMod val="50000"/>
+                  </a:schemeClr>
+                </a:solidFill>
+                <a:latin typeface="Verdana" panose="020B0604030504040204" pitchFamily="34" charset="0"/>
+                <a:ea typeface="Verdana" panose="020B0604030504040204" pitchFamily="34" charset="0"/>
+                <a:cs typeface="Verdana" panose="020B0604030504040204" pitchFamily="34" charset="0"/>
+              </a:rPr>
+              <a:t>30 sec audio by track</a:t>
+            </a:r>
+          </a:p>
+          <a:p>
+            <a:pPr algn="ctr"/>
+            <a:endParaRPr lang="en-FR" sz="1100" dirty="0">
+              <a:solidFill>
+                <a:schemeClr val="bg2">
+                  <a:lumMod val="50000"/>
+                </a:schemeClr>
+              </a:solidFill>
+            </a:endParaRPr>
+          </a:p>
+        </p:txBody>
+      </p:sp>
+      <p:sp>
+        <p:nvSpPr>
+          <p:cNvPr id="32" name="Round Diagonal Corner of Rectangle 31">
+            <a:extLst>
+              <a:ext uri="{FF2B5EF4-FFF2-40B4-BE49-F238E27FC236}">
+                <a16:creationId xmlns:a16="http://schemas.microsoft.com/office/drawing/2014/main" id="{966AD493-93C0-A449-966C-C29639913299}"/>
+              </a:ext>
+            </a:extLst>
+          </p:cNvPr>
+          <p:cNvSpPr/>
+          <p:nvPr/>
+        </p:nvSpPr>
+        <p:spPr>
+          <a:xfrm>
+            <a:off x="9052107" y="859708"/>
+            <a:ext cx="2643743" cy="740198"/>
+          </a:xfrm>
+          <a:prstGeom prst="round2DiagRect">
+            <a:avLst>
+              <a:gd name="adj1" fmla="val 16667"/>
+              <a:gd name="adj2" fmla="val 0"/>
+            </a:avLst>
+          </a:prstGeom>
+          <a:solidFill>
+            <a:schemeClr val="bg2">
+              <a:lumMod val="90000"/>
+            </a:schemeClr>
+          </a:solidFill>
+          <a:ln>
+            <a:noFill/>
+          </a:ln>
+        </p:spPr>
+        <p:style>
+          <a:lnRef idx="2">
+            <a:schemeClr val="accent1">
+              <a:shade val="50000"/>
+            </a:schemeClr>
+          </a:lnRef>
+          <a:fillRef idx="1">
+            <a:schemeClr val="accent1"/>
+          </a:fillRef>
+          <a:effectRef idx="0">
+            <a:schemeClr val="accent1"/>
+          </a:effectRef>
+          <a:fontRef idx="minor">
+            <a:schemeClr val="lt1"/>
+          </a:fontRef>
+        </p:style>
+        <p:txBody>
+          <a:bodyPr rtlCol="0" anchor="ctr"/>
+          <a:lstStyle/>
+          <a:p>
+            <a:r>
+              <a:rPr lang="en-FR" sz="1200" dirty="0">
+                <a:solidFill>
+                  <a:schemeClr val="bg2">
+                    <a:lumMod val="50000"/>
+                  </a:schemeClr>
+                </a:solidFill>
+                <a:latin typeface="Verdana" panose="020B0604030504040204" pitchFamily="34" charset="0"/>
+                <a:ea typeface="Verdana" panose="020B0604030504040204" pitchFamily="34" charset="0"/>
+                <a:cs typeface="Verdana" panose="020B0604030504040204" pitchFamily="34" charset="0"/>
+              </a:rPr>
+              <a:t>1000 rows</a:t>
+            </a:r>
+          </a:p>
+          <a:p>
+            <a:r>
+              <a:rPr lang="en-FR" sz="1200" dirty="0">
+                <a:solidFill>
+                  <a:schemeClr val="bg2">
+                    <a:lumMod val="50000"/>
+                  </a:schemeClr>
+                </a:solidFill>
+                <a:latin typeface="Verdana" panose="020B0604030504040204" pitchFamily="34" charset="0"/>
+                <a:ea typeface="Verdana" panose="020B0604030504040204" pitchFamily="34" charset="0"/>
+                <a:cs typeface="Verdana" panose="020B0604030504040204" pitchFamily="34" charset="0"/>
+              </a:rPr>
+              <a:t>28 columns</a:t>
+            </a:r>
+          </a:p>
+          <a:p>
+            <a:r>
+              <a:rPr lang="en-FR" sz="1200" dirty="0">
+                <a:solidFill>
+                  <a:schemeClr val="bg2">
+                    <a:lumMod val="50000"/>
+                  </a:schemeClr>
+                </a:solidFill>
+                <a:latin typeface="Verdana" panose="020B0604030504040204" pitchFamily="34" charset="0"/>
+                <a:ea typeface="Verdana" panose="020B0604030504040204" pitchFamily="34" charset="0"/>
+                <a:cs typeface="Verdana" panose="020B0604030504040204" pitchFamily="34" charset="0"/>
+              </a:rPr>
+              <a:t>Music Genre as label</a:t>
+            </a:r>
+          </a:p>
+          <a:p>
+            <a:pPr algn="ctr"/>
+            <a:endParaRPr lang="en-FR" sz="1100" dirty="0">
+              <a:solidFill>
+                <a:schemeClr val="bg2">
+                  <a:lumMod val="50000"/>
+                </a:schemeClr>
+              </a:solidFill>
+            </a:endParaRPr>
+          </a:p>
+        </p:txBody>
+      </p:sp>
+      <p:pic>
+        <p:nvPicPr>
+          <p:cNvPr id="33" name="Picture 32">
+            <a:extLst>
+              <a:ext uri="{FF2B5EF4-FFF2-40B4-BE49-F238E27FC236}">
+                <a16:creationId xmlns:a16="http://schemas.microsoft.com/office/drawing/2014/main" id="{C535BA83-D234-5642-B36B-668EA9AA375D}"/>
+              </a:ext>
+            </a:extLst>
+          </p:cNvPr>
+          <p:cNvPicPr>
+            <a:picLocks noChangeAspect="1"/>
+          </p:cNvPicPr>
+          <p:nvPr/>
+        </p:nvPicPr>
+        <p:blipFill>
+          <a:blip r:embed="rId7"/>
+          <a:stretch>
+            <a:fillRect/>
+          </a:stretch>
+        </p:blipFill>
+        <p:spPr>
+          <a:xfrm>
+            <a:off x="9098514" y="2318783"/>
+            <a:ext cx="2747844" cy="2747844"/>
+          </a:xfrm>
+          <a:prstGeom prst="rect">
+            <a:avLst/>
+          </a:prstGeom>
+        </p:spPr>
+      </p:pic>
+      <p:sp>
+        <p:nvSpPr>
+          <p:cNvPr id="35" name="TextBox 34">
+            <a:extLst>
+              <a:ext uri="{FF2B5EF4-FFF2-40B4-BE49-F238E27FC236}">
+                <a16:creationId xmlns:a16="http://schemas.microsoft.com/office/drawing/2014/main" id="{65509FEA-F791-DE4B-98B5-F5A82C55FB52}"/>
+              </a:ext>
+            </a:extLst>
+          </p:cNvPr>
+          <p:cNvSpPr txBox="1"/>
+          <p:nvPr/>
+        </p:nvSpPr>
+        <p:spPr>
+          <a:xfrm>
+            <a:off x="9219249" y="297072"/>
+            <a:ext cx="2145323" cy="369332"/>
+          </a:xfrm>
+          <a:prstGeom prst="rect">
+            <a:avLst/>
+          </a:prstGeom>
+          <a:noFill/>
+        </p:spPr>
+        <p:txBody>
+          <a:bodyPr wrap="square" rtlCol="0">
+            <a:spAutoFit/>
+          </a:bodyPr>
+          <a:lstStyle/>
+          <a:p>
+            <a:r>
+              <a:rPr lang="en-FR" dirty="0"/>
+              <a:t>Single .CSV Dataset</a:t>
+            </a:r>
+          </a:p>
+        </p:txBody>
+      </p:sp>
+      <p:sp>
+        <p:nvSpPr>
+          <p:cNvPr id="36" name="TextBox 35">
+            <a:extLst>
+              <a:ext uri="{FF2B5EF4-FFF2-40B4-BE49-F238E27FC236}">
+                <a16:creationId xmlns:a16="http://schemas.microsoft.com/office/drawing/2014/main" id="{E6C66B13-4AB3-4B4E-B0C2-0003865CB72E}"/>
+              </a:ext>
+            </a:extLst>
+          </p:cNvPr>
+          <p:cNvSpPr txBox="1"/>
+          <p:nvPr/>
+        </p:nvSpPr>
+        <p:spPr>
+          <a:xfrm>
+            <a:off x="4496954" y="930572"/>
+            <a:ext cx="4555153" cy="1477328"/>
+          </a:xfrm>
+          <a:prstGeom prst="rect">
+            <a:avLst/>
+          </a:prstGeom>
+          <a:noFill/>
+        </p:spPr>
+        <p:txBody>
+          <a:bodyPr wrap="square" rtlCol="0">
+            <a:spAutoFit/>
+          </a:bodyPr>
+          <a:lstStyle/>
+          <a:p>
+            <a:pPr fontAlgn="base"/>
+            <a:r>
+              <a:rPr lang="en-GB" dirty="0">
+                <a:solidFill>
+                  <a:schemeClr val="bg2">
+                    <a:lumMod val="50000"/>
+                  </a:schemeClr>
+                </a:solidFill>
+                <a:latin typeface="Anonymice Powerline" panose="02060609030202000504" pitchFamily="49" charset="0"/>
+                <a:ea typeface="Anonymice Powerline" panose="02060609030202000504" pitchFamily="49" charset="0"/>
+              </a:rPr>
+              <a:t>Zero crossing rate</a:t>
+            </a:r>
+          </a:p>
+          <a:p>
+            <a:pPr fontAlgn="base"/>
+            <a:r>
+              <a:rPr lang="en-GB" dirty="0">
+                <a:solidFill>
+                  <a:schemeClr val="bg2">
+                    <a:lumMod val="50000"/>
+                  </a:schemeClr>
+                </a:solidFill>
+                <a:latin typeface="Anonymice Powerline" panose="02060609030202000504" pitchFamily="49" charset="0"/>
+                <a:ea typeface="Anonymice Powerline" panose="02060609030202000504" pitchFamily="49" charset="0"/>
+              </a:rPr>
+              <a:t>Spectral centroid</a:t>
+            </a:r>
+          </a:p>
+          <a:p>
+            <a:pPr fontAlgn="base"/>
+            <a:r>
+              <a:rPr lang="en-GB" dirty="0">
+                <a:solidFill>
+                  <a:schemeClr val="bg2">
+                    <a:lumMod val="50000"/>
+                  </a:schemeClr>
+                </a:solidFill>
+                <a:latin typeface="Anonymice Powerline" panose="02060609030202000504" pitchFamily="49" charset="0"/>
+                <a:ea typeface="Anonymice Powerline" panose="02060609030202000504" pitchFamily="49" charset="0"/>
+              </a:rPr>
+              <a:t>Spectral bandwidth</a:t>
+            </a:r>
+          </a:p>
+          <a:p>
+            <a:pPr fontAlgn="base"/>
+            <a:r>
+              <a:rPr lang="en-GB" dirty="0">
+                <a:solidFill>
+                  <a:schemeClr val="bg2">
+                    <a:lumMod val="50000"/>
+                  </a:schemeClr>
+                </a:solidFill>
+                <a:latin typeface="Anonymice Powerline" panose="02060609030202000504" pitchFamily="49" charset="0"/>
+                <a:ea typeface="Anonymice Powerline" panose="02060609030202000504" pitchFamily="49" charset="0"/>
+              </a:rPr>
+              <a:t>Spectral </a:t>
+            </a:r>
+            <a:r>
+              <a:rPr lang="en-GB" dirty="0" err="1">
+                <a:solidFill>
+                  <a:schemeClr val="bg2">
+                    <a:lumMod val="50000"/>
+                  </a:schemeClr>
+                </a:solidFill>
+                <a:latin typeface="Anonymice Powerline" panose="02060609030202000504" pitchFamily="49" charset="0"/>
+                <a:ea typeface="Anonymice Powerline" panose="02060609030202000504" pitchFamily="49" charset="0"/>
+              </a:rPr>
+              <a:t>rolloff</a:t>
+            </a:r>
+            <a:endParaRPr lang="en-GB" dirty="0">
+              <a:solidFill>
+                <a:schemeClr val="bg2">
+                  <a:lumMod val="50000"/>
+                </a:schemeClr>
+              </a:solidFill>
+              <a:latin typeface="Anonymice Powerline" panose="02060609030202000504" pitchFamily="49" charset="0"/>
+              <a:ea typeface="Anonymice Powerline" panose="02060609030202000504" pitchFamily="49" charset="0"/>
+            </a:endParaRPr>
+          </a:p>
+          <a:p>
+            <a:endParaRPr lang="en-FR" dirty="0">
+              <a:solidFill>
+                <a:schemeClr val="bg2">
+                  <a:lumMod val="50000"/>
+                </a:schemeClr>
+              </a:solidFill>
+              <a:latin typeface="Anonymice Powerline" panose="02060609030202000504" pitchFamily="49" charset="0"/>
+              <a:ea typeface="Anonymice Powerline" panose="02060609030202000504" pitchFamily="49" charset="0"/>
+            </a:endParaRPr>
+          </a:p>
+        </p:txBody>
+      </p:sp>
+      <p:sp>
+        <p:nvSpPr>
+          <p:cNvPr id="37" name="TextBox 36">
+            <a:extLst>
+              <a:ext uri="{FF2B5EF4-FFF2-40B4-BE49-F238E27FC236}">
+                <a16:creationId xmlns:a16="http://schemas.microsoft.com/office/drawing/2014/main" id="{F4171DFA-1B37-694A-B8E7-8D17E4376E49}"/>
+              </a:ext>
+            </a:extLst>
+          </p:cNvPr>
+          <p:cNvSpPr txBox="1"/>
+          <p:nvPr/>
+        </p:nvSpPr>
+        <p:spPr>
+          <a:xfrm>
+            <a:off x="4496954" y="5027298"/>
+            <a:ext cx="4555153" cy="1754326"/>
+          </a:xfrm>
+          <a:prstGeom prst="rect">
+            <a:avLst/>
+          </a:prstGeom>
+          <a:noFill/>
+        </p:spPr>
+        <p:txBody>
+          <a:bodyPr wrap="square" rtlCol="0">
+            <a:spAutoFit/>
+          </a:bodyPr>
+          <a:lstStyle/>
+          <a:p>
+            <a:pPr fontAlgn="base"/>
+            <a:r>
+              <a:rPr lang="en-GB" dirty="0">
+                <a:solidFill>
+                  <a:schemeClr val="bg2">
+                    <a:lumMod val="50000"/>
+                  </a:schemeClr>
+                </a:solidFill>
+                <a:latin typeface="Anonymice Powerline" panose="02060609030202000504" pitchFamily="49" charset="0"/>
+                <a:ea typeface="Anonymice Powerline" panose="02060609030202000504" pitchFamily="49" charset="0"/>
+              </a:rPr>
+              <a:t>Mel-Frequency Cepstral Coefficients</a:t>
+            </a:r>
+          </a:p>
+          <a:p>
+            <a:pPr fontAlgn="base"/>
+            <a:r>
+              <a:rPr lang="en-GB" dirty="0">
+                <a:solidFill>
+                  <a:schemeClr val="bg2">
+                    <a:lumMod val="50000"/>
+                  </a:schemeClr>
+                </a:solidFill>
+                <a:latin typeface="Anonymice Powerline" panose="02060609030202000504" pitchFamily="49" charset="0"/>
+                <a:ea typeface="Anonymice Powerline" panose="02060609030202000504" pitchFamily="49" charset="0"/>
+              </a:rPr>
+              <a:t>Chroma frequencies</a:t>
+            </a:r>
+          </a:p>
+          <a:p>
+            <a:pPr fontAlgn="base"/>
+            <a:r>
+              <a:rPr lang="en-GB" dirty="0">
+                <a:solidFill>
+                  <a:schemeClr val="bg2">
+                    <a:lumMod val="50000"/>
+                  </a:schemeClr>
+                </a:solidFill>
+                <a:latin typeface="Anonymice Powerline" panose="02060609030202000504" pitchFamily="49" charset="0"/>
+                <a:ea typeface="Anonymice Powerline" panose="02060609030202000504" pitchFamily="49" charset="0"/>
+              </a:rPr>
+              <a:t>RMSE (Root Mean Square Energy)</a:t>
+            </a:r>
+          </a:p>
+          <a:p>
+            <a:pPr fontAlgn="base"/>
+            <a:r>
+              <a:rPr lang="en-GB" dirty="0">
+                <a:solidFill>
+                  <a:schemeClr val="bg2">
+                    <a:lumMod val="50000"/>
+                  </a:schemeClr>
+                </a:solidFill>
+                <a:latin typeface="Anonymice Powerline" panose="02060609030202000504" pitchFamily="49" charset="0"/>
+                <a:ea typeface="Anonymice Powerline" panose="02060609030202000504" pitchFamily="49" charset="0"/>
+              </a:rPr>
+              <a:t>Etc…</a:t>
+            </a:r>
+          </a:p>
+          <a:p>
+            <a:endParaRPr lang="en-FR" dirty="0">
+              <a:latin typeface="Anonymice Powerline" panose="02060609030202000504" pitchFamily="49" charset="0"/>
+              <a:ea typeface="Anonymice Powerline" panose="02060609030202000504" pitchFamily="49" charset="0"/>
+            </a:endParaRPr>
+          </a:p>
+        </p:txBody>
+      </p:sp>
+    </p:spTree>
+    <p:extLst>
+      <p:ext uri="{BB962C8B-B14F-4D97-AF65-F5344CB8AC3E}">
+        <p14:creationId xmlns:p14="http://schemas.microsoft.com/office/powerpoint/2010/main" val="1841175441"/>
+      </p:ext>
+    </p:extLst>
+  </p:cSld>
+  <p:clrMapOvr>
+    <a:masterClrMapping/>
+  </p:clrMapOvr>
+</p:sld>
+</file>
+
+<file path=ppt/slides/slide3.xml><?xml version="1.0" encoding="utf-8"?>
+<p:sld xmlns:a="http://schemas.openxmlformats.org/drawingml/2006/main" xmlns:r="http://schemas.openxmlformats.org/officeDocument/2006/relationships" xmlns:p="http://schemas.openxmlformats.org/presentationml/2006/main">
+  <p:cSld>
+    <p:spTree>
+      <p:nvGrpSpPr>
+        <p:cNvPr id="1" name=""/>
+        <p:cNvGrpSpPr/>
+        <p:nvPr/>
+      </p:nvGrpSpPr>
+      <p:grpSpPr>
+        <a:xfrm>
+          <a:off x="0" y="0"/>
+          <a:ext cx="0" cy="0"/>
+          <a:chOff x="0" y="0"/>
+          <a:chExt cx="0" cy="0"/>
+        </a:xfrm>
+      </p:grpSpPr>
+      <p:sp>
+        <p:nvSpPr>
+          <p:cNvPr id="4" name="TextBox 3">
+            <a:extLst>
+              <a:ext uri="{FF2B5EF4-FFF2-40B4-BE49-F238E27FC236}">
+                <a16:creationId xmlns:a16="http://schemas.microsoft.com/office/drawing/2014/main" id="{4C2210E9-A828-614B-B551-24EC7B6BE3E8}"/>
+              </a:ext>
+            </a:extLst>
+          </p:cNvPr>
+          <p:cNvSpPr txBox="1"/>
+          <p:nvPr/>
+        </p:nvSpPr>
+        <p:spPr>
+          <a:xfrm>
+            <a:off x="747251" y="292177"/>
+            <a:ext cx="2145323" cy="369332"/>
+          </a:xfrm>
+          <a:prstGeom prst="rect">
+            <a:avLst/>
+          </a:prstGeom>
+          <a:noFill/>
+        </p:spPr>
+        <p:txBody>
+          <a:bodyPr wrap="square" rtlCol="0">
+            <a:spAutoFit/>
+          </a:bodyPr>
+          <a:lstStyle/>
+          <a:p>
+            <a:r>
+              <a:rPr lang="en-FR" dirty="0"/>
+              <a:t>1000 MP3 Files</a:t>
+            </a:r>
+          </a:p>
+        </p:txBody>
+      </p:sp>
+      <p:sp>
+        <p:nvSpPr>
+          <p:cNvPr id="6" name="Rounded Rectangle 5">
+            <a:extLst>
+              <a:ext uri="{FF2B5EF4-FFF2-40B4-BE49-F238E27FC236}">
+                <a16:creationId xmlns:a16="http://schemas.microsoft.com/office/drawing/2014/main" id="{25433829-715F-5A4E-AE89-873068402FE4}"/>
+              </a:ext>
+            </a:extLst>
+          </p:cNvPr>
+          <p:cNvSpPr/>
+          <p:nvPr/>
+        </p:nvSpPr>
+        <p:spPr>
+          <a:xfrm>
+            <a:off x="345642" y="1822253"/>
+            <a:ext cx="2643743" cy="496530"/>
+          </a:xfrm>
+          <a:prstGeom prst="roundRect">
+            <a:avLst/>
+          </a:prstGeom>
+        </p:spPr>
+        <p:style>
+          <a:lnRef idx="2">
+            <a:schemeClr val="accent1">
+              <a:shade val="50000"/>
+            </a:schemeClr>
+          </a:lnRef>
+          <a:fillRef idx="1">
+            <a:schemeClr val="accent1"/>
+          </a:fillRef>
+          <a:effectRef idx="0">
+            <a:schemeClr val="accent1"/>
+          </a:effectRef>
+          <a:fontRef idx="minor">
+            <a:schemeClr val="lt1"/>
+          </a:fontRef>
+        </p:style>
+        <p:txBody>
+          <a:bodyPr rtlCol="0" anchor="ctr"/>
+          <a:lstStyle/>
+          <a:p>
+            <a:pPr algn="ctr"/>
+            <a:r>
+              <a:rPr lang="en-GB" dirty="0"/>
+              <a:t>b</a:t>
+            </a:r>
+            <a:r>
+              <a:rPr lang="en-FR" dirty="0"/>
+              <a:t>lues01.mp3</a:t>
+            </a:r>
+          </a:p>
+        </p:txBody>
+      </p:sp>
+      <p:pic>
+        <p:nvPicPr>
+          <p:cNvPr id="9" name="Picture 8">
+            <a:extLst>
+              <a:ext uri="{FF2B5EF4-FFF2-40B4-BE49-F238E27FC236}">
+                <a16:creationId xmlns:a16="http://schemas.microsoft.com/office/drawing/2014/main" id="{5C2F5C08-54F6-0C43-97B9-E0B95E1931FC}"/>
+              </a:ext>
+            </a:extLst>
+          </p:cNvPr>
+          <p:cNvPicPr>
+            <a:picLocks noChangeAspect="1"/>
+          </p:cNvPicPr>
+          <p:nvPr/>
+        </p:nvPicPr>
+        <p:blipFill>
+          <a:blip r:embed="rId3"/>
+          <a:stretch>
+            <a:fillRect/>
+          </a:stretch>
+        </p:blipFill>
+        <p:spPr>
+          <a:xfrm>
+            <a:off x="345642" y="1822253"/>
+            <a:ext cx="620663" cy="496530"/>
+          </a:xfrm>
+          <a:prstGeom prst="rect">
+            <a:avLst/>
+          </a:prstGeom>
+        </p:spPr>
+      </p:pic>
+      <p:sp>
+        <p:nvSpPr>
+          <p:cNvPr id="10" name="Rounded Rectangle 9">
+            <a:extLst>
+              <a:ext uri="{FF2B5EF4-FFF2-40B4-BE49-F238E27FC236}">
+                <a16:creationId xmlns:a16="http://schemas.microsoft.com/office/drawing/2014/main" id="{FD474DDD-02A1-8A4E-A70F-3B723BF3AF5D}"/>
+              </a:ext>
+            </a:extLst>
+          </p:cNvPr>
+          <p:cNvSpPr/>
+          <p:nvPr/>
+        </p:nvSpPr>
+        <p:spPr>
+          <a:xfrm>
+            <a:off x="345642" y="2603918"/>
+            <a:ext cx="2643743" cy="496530"/>
+          </a:xfrm>
+          <a:prstGeom prst="roundRect">
+            <a:avLst/>
+          </a:prstGeom>
+          <a:solidFill>
+            <a:schemeClr val="accent2"/>
+          </a:solidFill>
+        </p:spPr>
+        <p:style>
+          <a:lnRef idx="2">
+            <a:schemeClr val="accent1">
+              <a:shade val="50000"/>
+            </a:schemeClr>
+          </a:lnRef>
+          <a:fillRef idx="1">
+            <a:schemeClr val="accent1"/>
+          </a:fillRef>
+          <a:effectRef idx="0">
+            <a:schemeClr val="accent1"/>
+          </a:effectRef>
+          <a:fontRef idx="minor">
+            <a:schemeClr val="lt1"/>
+          </a:fontRef>
+        </p:style>
+        <p:txBody>
+          <a:bodyPr rtlCol="0" anchor="ctr"/>
+          <a:lstStyle/>
+          <a:p>
+            <a:pPr algn="ctr"/>
+            <a:r>
+              <a:rPr lang="fr-FR" dirty="0"/>
+              <a:t>rock</a:t>
+            </a:r>
+            <a:r>
+              <a:rPr lang="en-FR" dirty="0"/>
+              <a:t>12.mp3</a:t>
+            </a:r>
+          </a:p>
+        </p:txBody>
+      </p:sp>
+      <p:pic>
+        <p:nvPicPr>
+          <p:cNvPr id="11" name="Picture 10">
+            <a:extLst>
+              <a:ext uri="{FF2B5EF4-FFF2-40B4-BE49-F238E27FC236}">
+                <a16:creationId xmlns:a16="http://schemas.microsoft.com/office/drawing/2014/main" id="{3D055D8F-CA9B-FB48-8B2B-DDDE5C3A1A4D}"/>
+              </a:ext>
+            </a:extLst>
+          </p:cNvPr>
+          <p:cNvPicPr>
+            <a:picLocks noChangeAspect="1"/>
+          </p:cNvPicPr>
+          <p:nvPr/>
+        </p:nvPicPr>
+        <p:blipFill>
+          <a:blip r:embed="rId3"/>
+          <a:stretch>
+            <a:fillRect/>
+          </a:stretch>
+        </p:blipFill>
+        <p:spPr>
+          <a:xfrm>
+            <a:off x="345642" y="2603918"/>
+            <a:ext cx="620663" cy="496530"/>
+          </a:xfrm>
+          <a:prstGeom prst="rect">
+            <a:avLst/>
+          </a:prstGeom>
+        </p:spPr>
+      </p:pic>
+      <p:sp>
+        <p:nvSpPr>
+          <p:cNvPr id="12" name="Rounded Rectangle 11">
+            <a:extLst>
+              <a:ext uri="{FF2B5EF4-FFF2-40B4-BE49-F238E27FC236}">
+                <a16:creationId xmlns:a16="http://schemas.microsoft.com/office/drawing/2014/main" id="{0B4B074D-CF2B-1749-9275-91C60DE75FC1}"/>
+              </a:ext>
+            </a:extLst>
+          </p:cNvPr>
+          <p:cNvSpPr/>
+          <p:nvPr/>
+        </p:nvSpPr>
+        <p:spPr>
+          <a:xfrm>
+            <a:off x="345642" y="3385583"/>
+            <a:ext cx="2643743" cy="496530"/>
+          </a:xfrm>
+          <a:prstGeom prst="roundRect">
+            <a:avLst/>
+          </a:prstGeom>
+          <a:solidFill>
+            <a:srgbClr val="7030A0"/>
+          </a:solidFill>
+        </p:spPr>
+        <p:style>
+          <a:lnRef idx="2">
+            <a:schemeClr val="accent1">
+              <a:shade val="50000"/>
+            </a:schemeClr>
+          </a:lnRef>
+          <a:fillRef idx="1">
+            <a:schemeClr val="accent1"/>
+          </a:fillRef>
+          <a:effectRef idx="0">
+            <a:schemeClr val="accent1"/>
+          </a:effectRef>
+          <a:fontRef idx="minor">
+            <a:schemeClr val="lt1"/>
+          </a:fontRef>
+        </p:style>
+        <p:txBody>
+          <a:bodyPr rtlCol="0" anchor="ctr"/>
+          <a:lstStyle/>
+          <a:p>
+            <a:pPr algn="ctr"/>
+            <a:r>
+              <a:rPr lang="fr-FR" dirty="0"/>
+              <a:t>hiphop</a:t>
+            </a:r>
+            <a:r>
+              <a:rPr lang="en-FR" dirty="0"/>
+              <a:t>02.mp3</a:t>
+            </a:r>
+          </a:p>
+        </p:txBody>
+      </p:sp>
+      <p:pic>
+        <p:nvPicPr>
+          <p:cNvPr id="13" name="Picture 12">
+            <a:extLst>
+              <a:ext uri="{FF2B5EF4-FFF2-40B4-BE49-F238E27FC236}">
+                <a16:creationId xmlns:a16="http://schemas.microsoft.com/office/drawing/2014/main" id="{829ED377-0470-4C43-AC8A-965C7EC718BF}"/>
+              </a:ext>
+            </a:extLst>
+          </p:cNvPr>
+          <p:cNvPicPr>
+            <a:picLocks noChangeAspect="1"/>
+          </p:cNvPicPr>
+          <p:nvPr/>
+        </p:nvPicPr>
+        <p:blipFill>
+          <a:blip r:embed="rId3"/>
+          <a:stretch>
+            <a:fillRect/>
+          </a:stretch>
+        </p:blipFill>
+        <p:spPr>
+          <a:xfrm>
+            <a:off x="345642" y="3385583"/>
+            <a:ext cx="620663" cy="496530"/>
+          </a:xfrm>
+          <a:prstGeom prst="rect">
+            <a:avLst/>
+          </a:prstGeom>
+        </p:spPr>
+      </p:pic>
+      <p:sp>
+        <p:nvSpPr>
+          <p:cNvPr id="16" name="Rounded Rectangle 15">
+            <a:extLst>
+              <a:ext uri="{FF2B5EF4-FFF2-40B4-BE49-F238E27FC236}">
+                <a16:creationId xmlns:a16="http://schemas.microsoft.com/office/drawing/2014/main" id="{95890EC4-7188-E944-AE11-AD0C0B88ECA6}"/>
+              </a:ext>
+            </a:extLst>
+          </p:cNvPr>
+          <p:cNvSpPr/>
+          <p:nvPr/>
+        </p:nvSpPr>
+        <p:spPr>
+          <a:xfrm>
+            <a:off x="345642" y="4571998"/>
+            <a:ext cx="2643743" cy="496530"/>
+          </a:xfrm>
+          <a:prstGeom prst="roundRect">
+            <a:avLst/>
+          </a:prstGeom>
+          <a:solidFill>
+            <a:schemeClr val="accent2"/>
+          </a:solidFill>
+        </p:spPr>
+        <p:style>
+          <a:lnRef idx="2">
+            <a:schemeClr val="accent1">
+              <a:shade val="50000"/>
+            </a:schemeClr>
+          </a:lnRef>
+          <a:fillRef idx="1">
+            <a:schemeClr val="accent1"/>
+          </a:fillRef>
+          <a:effectRef idx="0">
+            <a:schemeClr val="accent1"/>
+          </a:effectRef>
+          <a:fontRef idx="minor">
+            <a:schemeClr val="lt1"/>
+          </a:fontRef>
+        </p:style>
+        <p:txBody>
+          <a:bodyPr rtlCol="0" anchor="ctr"/>
+          <a:lstStyle/>
+          <a:p>
+            <a:pPr algn="ctr"/>
+            <a:r>
+              <a:rPr lang="fr-FR" dirty="0"/>
+              <a:t>rock</a:t>
+            </a:r>
+            <a:r>
+              <a:rPr lang="en-FR" dirty="0"/>
+              <a:t>13.mp3</a:t>
+            </a:r>
+          </a:p>
+        </p:txBody>
+      </p:sp>
+      <p:pic>
+        <p:nvPicPr>
+          <p:cNvPr id="17" name="Picture 16">
+            <a:extLst>
+              <a:ext uri="{FF2B5EF4-FFF2-40B4-BE49-F238E27FC236}">
+                <a16:creationId xmlns:a16="http://schemas.microsoft.com/office/drawing/2014/main" id="{0F053492-B0DC-A54F-9DDB-9617F853F968}"/>
+              </a:ext>
+            </a:extLst>
+          </p:cNvPr>
+          <p:cNvPicPr>
+            <a:picLocks noChangeAspect="1"/>
+          </p:cNvPicPr>
+          <p:nvPr/>
+        </p:nvPicPr>
+        <p:blipFill>
+          <a:blip r:embed="rId3"/>
+          <a:stretch>
+            <a:fillRect/>
+          </a:stretch>
+        </p:blipFill>
+        <p:spPr>
+          <a:xfrm>
+            <a:off x="345642" y="4571998"/>
+            <a:ext cx="620663" cy="496530"/>
+          </a:xfrm>
+          <a:prstGeom prst="rect">
+            <a:avLst/>
+          </a:prstGeom>
+        </p:spPr>
+      </p:pic>
+      <p:sp>
+        <p:nvSpPr>
+          <p:cNvPr id="18" name="Rounded Rectangle 17">
+            <a:extLst>
+              <a:ext uri="{FF2B5EF4-FFF2-40B4-BE49-F238E27FC236}">
+                <a16:creationId xmlns:a16="http://schemas.microsoft.com/office/drawing/2014/main" id="{B603CC13-0E19-FC4B-AE05-5AA80C0095BD}"/>
+              </a:ext>
+            </a:extLst>
+          </p:cNvPr>
+          <p:cNvSpPr/>
+          <p:nvPr/>
+        </p:nvSpPr>
+        <p:spPr>
+          <a:xfrm>
+            <a:off x="345642" y="5351203"/>
+            <a:ext cx="2643743" cy="496530"/>
+          </a:xfrm>
+          <a:prstGeom prst="roundRect">
+            <a:avLst/>
+          </a:prstGeom>
+          <a:solidFill>
+            <a:schemeClr val="accent2"/>
+          </a:solidFill>
+        </p:spPr>
+        <p:style>
+          <a:lnRef idx="2">
+            <a:schemeClr val="accent1">
+              <a:shade val="50000"/>
+            </a:schemeClr>
+          </a:lnRef>
+          <a:fillRef idx="1">
+            <a:schemeClr val="accent1"/>
+          </a:fillRef>
+          <a:effectRef idx="0">
+            <a:schemeClr val="accent1"/>
+          </a:effectRef>
+          <a:fontRef idx="minor">
+            <a:schemeClr val="lt1"/>
+          </a:fontRef>
+        </p:style>
+        <p:txBody>
+          <a:bodyPr rtlCol="0" anchor="ctr"/>
+          <a:lstStyle/>
+          <a:p>
+            <a:pPr algn="ctr"/>
+            <a:r>
+              <a:rPr lang="fr-FR" dirty="0"/>
+              <a:t>rock</a:t>
+            </a:r>
+            <a:r>
+              <a:rPr lang="en-FR" dirty="0"/>
+              <a:t>15.mp3</a:t>
+            </a:r>
+          </a:p>
+        </p:txBody>
+      </p:sp>
+      <p:pic>
+        <p:nvPicPr>
+          <p:cNvPr id="19" name="Picture 18">
+            <a:extLst>
+              <a:ext uri="{FF2B5EF4-FFF2-40B4-BE49-F238E27FC236}">
+                <a16:creationId xmlns:a16="http://schemas.microsoft.com/office/drawing/2014/main" id="{5E76314E-95D5-9E43-A892-F1FEE3366247}"/>
+              </a:ext>
+            </a:extLst>
+          </p:cNvPr>
+          <p:cNvPicPr>
+            <a:picLocks noChangeAspect="1"/>
+          </p:cNvPicPr>
+          <p:nvPr/>
+        </p:nvPicPr>
+        <p:blipFill>
+          <a:blip r:embed="rId3"/>
+          <a:stretch>
+            <a:fillRect/>
+          </a:stretch>
+        </p:blipFill>
+        <p:spPr>
+          <a:xfrm>
+            <a:off x="345642" y="5351203"/>
+            <a:ext cx="620663" cy="496530"/>
+          </a:xfrm>
+          <a:prstGeom prst="rect">
+            <a:avLst/>
+          </a:prstGeom>
+        </p:spPr>
+      </p:pic>
+      <p:sp>
+        <p:nvSpPr>
+          <p:cNvPr id="20" name="Rounded Rectangle 19">
+            <a:extLst>
+              <a:ext uri="{FF2B5EF4-FFF2-40B4-BE49-F238E27FC236}">
+                <a16:creationId xmlns:a16="http://schemas.microsoft.com/office/drawing/2014/main" id="{60E05B3E-0730-3C48-9554-6532C1C51D91}"/>
+              </a:ext>
+            </a:extLst>
+          </p:cNvPr>
+          <p:cNvSpPr/>
+          <p:nvPr/>
+        </p:nvSpPr>
+        <p:spPr>
+          <a:xfrm>
+            <a:off x="345642" y="6130408"/>
+            <a:ext cx="2643743" cy="496530"/>
+          </a:xfrm>
+          <a:prstGeom prst="roundRect">
+            <a:avLst/>
+          </a:prstGeom>
+        </p:spPr>
+        <p:style>
+          <a:lnRef idx="2">
+            <a:schemeClr val="accent1">
+              <a:shade val="50000"/>
+            </a:schemeClr>
+          </a:lnRef>
+          <a:fillRef idx="1">
+            <a:schemeClr val="accent1"/>
+          </a:fillRef>
+          <a:effectRef idx="0">
+            <a:schemeClr val="accent1"/>
+          </a:effectRef>
+          <a:fontRef idx="minor">
+            <a:schemeClr val="lt1"/>
+          </a:fontRef>
+        </p:style>
+        <p:txBody>
+          <a:bodyPr rtlCol="0" anchor="ctr"/>
+          <a:lstStyle/>
+          <a:p>
+            <a:pPr algn="ctr"/>
+            <a:r>
+              <a:rPr lang="en-GB" dirty="0"/>
+              <a:t>b</a:t>
+            </a:r>
+            <a:r>
+              <a:rPr lang="en-FR" dirty="0"/>
+              <a:t>lues01.mp3</a:t>
+            </a:r>
+          </a:p>
+        </p:txBody>
+      </p:sp>
+      <p:pic>
+        <p:nvPicPr>
+          <p:cNvPr id="21" name="Picture 20">
+            <a:extLst>
+              <a:ext uri="{FF2B5EF4-FFF2-40B4-BE49-F238E27FC236}">
+                <a16:creationId xmlns:a16="http://schemas.microsoft.com/office/drawing/2014/main" id="{ABBC87B6-5DD3-B14E-9D60-721FBF3206CF}"/>
+              </a:ext>
+            </a:extLst>
+          </p:cNvPr>
+          <p:cNvPicPr>
+            <a:picLocks noChangeAspect="1"/>
+          </p:cNvPicPr>
+          <p:nvPr/>
+        </p:nvPicPr>
+        <p:blipFill>
+          <a:blip r:embed="rId3"/>
+          <a:stretch>
+            <a:fillRect/>
+          </a:stretch>
+        </p:blipFill>
+        <p:spPr>
+          <a:xfrm>
+            <a:off x="345642" y="6130408"/>
+            <a:ext cx="620663" cy="496530"/>
+          </a:xfrm>
+          <a:prstGeom prst="rect">
+            <a:avLst/>
+          </a:prstGeom>
+        </p:spPr>
+      </p:pic>
+      <p:sp>
+        <p:nvSpPr>
+          <p:cNvPr id="23" name="Oval 22">
+            <a:extLst>
+              <a:ext uri="{FF2B5EF4-FFF2-40B4-BE49-F238E27FC236}">
+                <a16:creationId xmlns:a16="http://schemas.microsoft.com/office/drawing/2014/main" id="{A3681E18-476D-8242-9119-351FD5D9A1F8}"/>
+              </a:ext>
+            </a:extLst>
+          </p:cNvPr>
+          <p:cNvSpPr/>
+          <p:nvPr/>
+        </p:nvSpPr>
+        <p:spPr>
+          <a:xfrm>
+            <a:off x="1194337" y="4102510"/>
+            <a:ext cx="186813" cy="186813"/>
+          </a:xfrm>
+          <a:prstGeom prst="ellipse">
+            <a:avLst/>
+          </a:prstGeom>
+          <a:solidFill>
+            <a:schemeClr val="bg2">
+              <a:lumMod val="25000"/>
+            </a:schemeClr>
+          </a:solidFill>
+          <a:ln>
+            <a:noFill/>
+          </a:ln>
+        </p:spPr>
+        <p:style>
+          <a:lnRef idx="2">
+            <a:schemeClr val="accent1">
+              <a:shade val="50000"/>
+            </a:schemeClr>
+          </a:lnRef>
+          <a:fillRef idx="1">
+            <a:schemeClr val="accent1"/>
+          </a:fillRef>
+          <a:effectRef idx="0">
+            <a:schemeClr val="accent1"/>
+          </a:effectRef>
+          <a:fontRef idx="minor">
+            <a:schemeClr val="lt1"/>
+          </a:fontRef>
+        </p:style>
+        <p:txBody>
+          <a:bodyPr rtlCol="0" anchor="ctr"/>
+          <a:lstStyle/>
+          <a:p>
+            <a:pPr algn="ctr"/>
+            <a:endParaRPr lang="en-FR"/>
+          </a:p>
+        </p:txBody>
+      </p:sp>
+      <p:sp>
+        <p:nvSpPr>
+          <p:cNvPr id="24" name="Oval 23">
+            <a:extLst>
+              <a:ext uri="{FF2B5EF4-FFF2-40B4-BE49-F238E27FC236}">
+                <a16:creationId xmlns:a16="http://schemas.microsoft.com/office/drawing/2014/main" id="{C4BD558A-054A-D145-9F24-E57E184609A1}"/>
+              </a:ext>
+            </a:extLst>
+          </p:cNvPr>
+          <p:cNvSpPr/>
+          <p:nvPr/>
+        </p:nvSpPr>
+        <p:spPr>
+          <a:xfrm>
+            <a:off x="1527404" y="4102510"/>
+            <a:ext cx="186813" cy="186813"/>
+          </a:xfrm>
+          <a:prstGeom prst="ellipse">
+            <a:avLst/>
+          </a:prstGeom>
+          <a:solidFill>
+            <a:schemeClr val="bg2">
+              <a:lumMod val="25000"/>
+            </a:schemeClr>
+          </a:solidFill>
+          <a:ln>
+            <a:noFill/>
+          </a:ln>
+        </p:spPr>
+        <p:style>
+          <a:lnRef idx="2">
+            <a:schemeClr val="accent1">
+              <a:shade val="50000"/>
+            </a:schemeClr>
+          </a:lnRef>
+          <a:fillRef idx="1">
+            <a:schemeClr val="accent1"/>
+          </a:fillRef>
+          <a:effectRef idx="0">
+            <a:schemeClr val="accent1"/>
+          </a:effectRef>
+          <a:fontRef idx="minor">
+            <a:schemeClr val="lt1"/>
+          </a:fontRef>
+        </p:style>
+        <p:txBody>
+          <a:bodyPr rtlCol="0" anchor="ctr"/>
+          <a:lstStyle/>
+          <a:p>
+            <a:pPr algn="ctr"/>
+            <a:endParaRPr lang="en-FR"/>
+          </a:p>
+        </p:txBody>
+      </p:sp>
+      <p:sp>
+        <p:nvSpPr>
+          <p:cNvPr id="25" name="Oval 24">
+            <a:extLst>
+              <a:ext uri="{FF2B5EF4-FFF2-40B4-BE49-F238E27FC236}">
+                <a16:creationId xmlns:a16="http://schemas.microsoft.com/office/drawing/2014/main" id="{E192A3A3-732B-4141-90B4-5DBA2B208708}"/>
+              </a:ext>
+            </a:extLst>
+          </p:cNvPr>
+          <p:cNvSpPr/>
+          <p:nvPr/>
+        </p:nvSpPr>
+        <p:spPr>
+          <a:xfrm>
+            <a:off x="1819913" y="4095134"/>
+            <a:ext cx="186813" cy="186813"/>
+          </a:xfrm>
+          <a:prstGeom prst="ellipse">
+            <a:avLst/>
+          </a:prstGeom>
+          <a:solidFill>
+            <a:schemeClr val="bg2">
+              <a:lumMod val="25000"/>
+            </a:schemeClr>
+          </a:solidFill>
+          <a:ln>
+            <a:noFill/>
+          </a:ln>
+        </p:spPr>
+        <p:style>
+          <a:lnRef idx="2">
+            <a:schemeClr val="accent1">
+              <a:shade val="50000"/>
+            </a:schemeClr>
+          </a:lnRef>
+          <a:fillRef idx="1">
+            <a:schemeClr val="accent1"/>
+          </a:fillRef>
+          <a:effectRef idx="0">
+            <a:schemeClr val="accent1"/>
+          </a:effectRef>
+          <a:fontRef idx="minor">
+            <a:schemeClr val="lt1"/>
+          </a:fontRef>
+        </p:style>
+        <p:txBody>
+          <a:bodyPr rtlCol="0" anchor="ctr"/>
+          <a:lstStyle/>
+          <a:p>
+            <a:pPr algn="ctr"/>
+            <a:endParaRPr lang="en-FR"/>
+          </a:p>
+        </p:txBody>
+      </p:sp>
+      <p:sp>
+        <p:nvSpPr>
+          <p:cNvPr id="26" name="Right Arrow 25">
+            <a:extLst>
+              <a:ext uri="{FF2B5EF4-FFF2-40B4-BE49-F238E27FC236}">
+                <a16:creationId xmlns:a16="http://schemas.microsoft.com/office/drawing/2014/main" id="{00DA3D30-60B5-3744-B457-C1A576E6CD4D}"/>
+              </a:ext>
+            </a:extLst>
+          </p:cNvPr>
+          <p:cNvSpPr/>
+          <p:nvPr/>
+        </p:nvSpPr>
+        <p:spPr>
+          <a:xfrm>
+            <a:off x="4496954" y="3210399"/>
+            <a:ext cx="3665919" cy="1039595"/>
+          </a:xfrm>
+          <a:prstGeom prst="rightArrow">
+            <a:avLst/>
+          </a:prstGeom>
+          <a:solidFill>
+            <a:schemeClr val="accent3">
+              <a:lumMod val="60000"/>
+              <a:lumOff val="40000"/>
+            </a:schemeClr>
+          </a:solidFill>
+          <a:ln>
+            <a:noFill/>
+          </a:ln>
+        </p:spPr>
+        <p:style>
+          <a:lnRef idx="2">
+            <a:schemeClr val="accent1">
+              <a:shade val="50000"/>
+            </a:schemeClr>
+          </a:lnRef>
+          <a:fillRef idx="1">
+            <a:schemeClr val="accent1"/>
+          </a:fillRef>
+          <a:effectRef idx="0">
+            <a:schemeClr val="accent1"/>
+          </a:effectRef>
+          <a:fontRef idx="minor">
+            <a:schemeClr val="lt1"/>
+          </a:fontRef>
+        </p:style>
+        <p:txBody>
+          <a:bodyPr rtlCol="0" anchor="ctr"/>
+          <a:lstStyle/>
+          <a:p>
+            <a:pPr algn="ctr"/>
+            <a:r>
+              <a:rPr lang="en-FR" sz="2000" dirty="0">
+                <a:latin typeface="Helvetica" pitchFamily="2" charset="0"/>
+              </a:rPr>
+              <a:t>Feature Extraction</a:t>
+            </a:r>
+          </a:p>
+        </p:txBody>
+      </p:sp>
+      <p:pic>
+        <p:nvPicPr>
+          <p:cNvPr id="28" name="Graphic 27">
+            <a:extLst>
+              <a:ext uri="{FF2B5EF4-FFF2-40B4-BE49-F238E27FC236}">
+                <a16:creationId xmlns:a16="http://schemas.microsoft.com/office/drawing/2014/main" id="{3B1C52C4-E6E0-8E4D-8737-E6E2003BD2BD}"/>
+              </a:ext>
+            </a:extLst>
+          </p:cNvPr>
+          <p:cNvPicPr>
+            <a:picLocks noChangeAspect="1"/>
+          </p:cNvPicPr>
+          <p:nvPr/>
+        </p:nvPicPr>
+        <p:blipFill>
+          <a:blip r:embed="rId4">
+            <a:extLst>
+              <a:ext uri="{96DAC541-7B7A-43D3-8B79-37D633B846F1}">
+                <asvg:svgBlip xmlns:asvg="http://schemas.microsoft.com/office/drawing/2016/SVG/main" r:embed="rId5"/>
+              </a:ext>
+            </a:extLst>
+          </a:blip>
+          <a:stretch>
+            <a:fillRect/>
+          </a:stretch>
+        </p:blipFill>
+        <p:spPr>
+          <a:xfrm>
+            <a:off x="5017447" y="2491936"/>
+            <a:ext cx="1759973" cy="717026"/>
+          </a:xfrm>
+          <a:prstGeom prst="rect">
+            <a:avLst/>
+          </a:prstGeom>
+        </p:spPr>
+      </p:pic>
+      <p:pic>
+        <p:nvPicPr>
+          <p:cNvPr id="29" name="Picture 28">
+            <a:extLst>
+              <a:ext uri="{FF2B5EF4-FFF2-40B4-BE49-F238E27FC236}">
+                <a16:creationId xmlns:a16="http://schemas.microsoft.com/office/drawing/2014/main" id="{DEADEE16-C84C-4D47-BAC3-DDE5099F6863}"/>
+              </a:ext>
+            </a:extLst>
+          </p:cNvPr>
+          <p:cNvPicPr>
+            <a:picLocks noChangeAspect="1"/>
+          </p:cNvPicPr>
+          <p:nvPr/>
+        </p:nvPicPr>
+        <p:blipFill>
+          <a:blip r:embed="rId6"/>
+          <a:stretch>
+            <a:fillRect/>
+          </a:stretch>
+        </p:blipFill>
+        <p:spPr>
+          <a:xfrm>
+            <a:off x="4808666" y="4249994"/>
+            <a:ext cx="2142767" cy="721657"/>
+          </a:xfrm>
+          <a:prstGeom prst="rect">
+            <a:avLst/>
+          </a:prstGeom>
+        </p:spPr>
+      </p:pic>
+      <p:sp>
+        <p:nvSpPr>
+          <p:cNvPr id="31" name="Round Diagonal Corner of Rectangle 30">
+            <a:extLst>
+              <a:ext uri="{FF2B5EF4-FFF2-40B4-BE49-F238E27FC236}">
+                <a16:creationId xmlns:a16="http://schemas.microsoft.com/office/drawing/2014/main" id="{55B7A9C1-6EA2-1E41-A57A-445ED32AE37B}"/>
+              </a:ext>
+            </a:extLst>
+          </p:cNvPr>
+          <p:cNvSpPr/>
+          <p:nvPr/>
+        </p:nvSpPr>
+        <p:spPr>
+          <a:xfrm>
+            <a:off x="345642" y="859708"/>
+            <a:ext cx="2643743" cy="740199"/>
+          </a:xfrm>
+          <a:prstGeom prst="round2DiagRect">
+            <a:avLst>
+              <a:gd name="adj1" fmla="val 16667"/>
+              <a:gd name="adj2" fmla="val 0"/>
+            </a:avLst>
+          </a:prstGeom>
+          <a:solidFill>
+            <a:schemeClr val="bg2">
+              <a:lumMod val="90000"/>
+            </a:schemeClr>
+          </a:solidFill>
+          <a:ln>
+            <a:noFill/>
+          </a:ln>
+        </p:spPr>
+        <p:style>
+          <a:lnRef idx="2">
+            <a:schemeClr val="accent1">
+              <a:shade val="50000"/>
+            </a:schemeClr>
+          </a:lnRef>
+          <a:fillRef idx="1">
+            <a:schemeClr val="accent1"/>
+          </a:fillRef>
+          <a:effectRef idx="0">
+            <a:schemeClr val="accent1"/>
+          </a:effectRef>
+          <a:fontRef idx="minor">
+            <a:schemeClr val="lt1"/>
+          </a:fontRef>
+        </p:style>
+        <p:txBody>
+          <a:bodyPr rtlCol="0" anchor="ctr"/>
+          <a:lstStyle/>
+          <a:p>
+            <a:r>
+              <a:rPr lang="en-FR" sz="1200" dirty="0">
+                <a:solidFill>
+                  <a:schemeClr val="bg2">
+                    <a:lumMod val="50000"/>
+                  </a:schemeClr>
+                </a:solidFill>
+                <a:latin typeface="Verdana" panose="020B0604030504040204" pitchFamily="34" charset="0"/>
+                <a:ea typeface="Verdana" panose="020B0604030504040204" pitchFamily="34" charset="0"/>
+                <a:cs typeface="Verdana" panose="020B0604030504040204" pitchFamily="34" charset="0"/>
+              </a:rPr>
+              <a:t>10 music genres</a:t>
+            </a:r>
+          </a:p>
+          <a:p>
+            <a:r>
+              <a:rPr lang="en-FR" sz="1200" dirty="0">
+                <a:solidFill>
+                  <a:schemeClr val="bg2">
+                    <a:lumMod val="50000"/>
+                  </a:schemeClr>
+                </a:solidFill>
+                <a:latin typeface="Verdana" panose="020B0604030504040204" pitchFamily="34" charset="0"/>
+                <a:ea typeface="Verdana" panose="020B0604030504040204" pitchFamily="34" charset="0"/>
+                <a:cs typeface="Verdana" panose="020B0604030504040204" pitchFamily="34" charset="0"/>
+              </a:rPr>
+              <a:t>100 tracks by genre</a:t>
+            </a:r>
+          </a:p>
+          <a:p>
+            <a:r>
+              <a:rPr lang="en-FR" sz="1200" dirty="0">
+                <a:solidFill>
+                  <a:schemeClr val="bg2">
+                    <a:lumMod val="50000"/>
+                  </a:schemeClr>
+                </a:solidFill>
+                <a:latin typeface="Verdana" panose="020B0604030504040204" pitchFamily="34" charset="0"/>
+                <a:ea typeface="Verdana" panose="020B0604030504040204" pitchFamily="34" charset="0"/>
+                <a:cs typeface="Verdana" panose="020B0604030504040204" pitchFamily="34" charset="0"/>
+              </a:rPr>
+              <a:t>30 sec audio by track</a:t>
+            </a:r>
+          </a:p>
+          <a:p>
+            <a:pPr algn="ctr"/>
+            <a:endParaRPr lang="en-FR" sz="1100" dirty="0">
+              <a:solidFill>
+                <a:schemeClr val="bg2">
+                  <a:lumMod val="50000"/>
+                </a:schemeClr>
+              </a:solidFill>
+            </a:endParaRPr>
+          </a:p>
+        </p:txBody>
+      </p:sp>
+      <p:sp>
+        <p:nvSpPr>
+          <p:cNvPr id="32" name="Round Diagonal Corner of Rectangle 31">
+            <a:extLst>
+              <a:ext uri="{FF2B5EF4-FFF2-40B4-BE49-F238E27FC236}">
+                <a16:creationId xmlns:a16="http://schemas.microsoft.com/office/drawing/2014/main" id="{966AD493-93C0-A449-966C-C29639913299}"/>
+              </a:ext>
+            </a:extLst>
+          </p:cNvPr>
+          <p:cNvSpPr/>
+          <p:nvPr/>
+        </p:nvSpPr>
+        <p:spPr>
+          <a:xfrm>
+            <a:off x="9052107" y="859708"/>
+            <a:ext cx="2643743" cy="740198"/>
+          </a:xfrm>
+          <a:prstGeom prst="round2DiagRect">
+            <a:avLst>
+              <a:gd name="adj1" fmla="val 16667"/>
+              <a:gd name="adj2" fmla="val 0"/>
+            </a:avLst>
+          </a:prstGeom>
+          <a:solidFill>
+            <a:schemeClr val="bg2">
+              <a:lumMod val="90000"/>
+            </a:schemeClr>
+          </a:solidFill>
+          <a:ln>
+            <a:noFill/>
+          </a:ln>
+        </p:spPr>
+        <p:style>
+          <a:lnRef idx="2">
+            <a:schemeClr val="accent1">
+              <a:shade val="50000"/>
+            </a:schemeClr>
+          </a:lnRef>
+          <a:fillRef idx="1">
+            <a:schemeClr val="accent1"/>
+          </a:fillRef>
+          <a:effectRef idx="0">
+            <a:schemeClr val="accent1"/>
+          </a:effectRef>
+          <a:fontRef idx="minor">
+            <a:schemeClr val="lt1"/>
+          </a:fontRef>
+        </p:style>
+        <p:txBody>
+          <a:bodyPr rtlCol="0" anchor="ctr"/>
+          <a:lstStyle/>
+          <a:p>
+            <a:r>
+              <a:rPr lang="en-FR" sz="1200" dirty="0">
+                <a:solidFill>
+                  <a:schemeClr val="bg2">
+                    <a:lumMod val="50000"/>
+                  </a:schemeClr>
+                </a:solidFill>
+                <a:latin typeface="Verdana" panose="020B0604030504040204" pitchFamily="34" charset="0"/>
+                <a:ea typeface="Verdana" panose="020B0604030504040204" pitchFamily="34" charset="0"/>
+                <a:cs typeface="Verdana" panose="020B0604030504040204" pitchFamily="34" charset="0"/>
+              </a:rPr>
+              <a:t>1000 rows</a:t>
+            </a:r>
+          </a:p>
+          <a:p>
+            <a:r>
+              <a:rPr lang="en-FR" sz="1200" dirty="0">
+                <a:solidFill>
+                  <a:schemeClr val="bg2">
+                    <a:lumMod val="50000"/>
+                  </a:schemeClr>
+                </a:solidFill>
+                <a:latin typeface="Verdana" panose="020B0604030504040204" pitchFamily="34" charset="0"/>
+                <a:ea typeface="Verdana" panose="020B0604030504040204" pitchFamily="34" charset="0"/>
+                <a:cs typeface="Verdana" panose="020B0604030504040204" pitchFamily="34" charset="0"/>
+              </a:rPr>
+              <a:t>64 columns</a:t>
+            </a:r>
+          </a:p>
+          <a:p>
+            <a:r>
+              <a:rPr lang="en-FR" sz="1200" dirty="0">
+                <a:solidFill>
+                  <a:schemeClr val="bg2">
+                    <a:lumMod val="50000"/>
+                  </a:schemeClr>
+                </a:solidFill>
+                <a:latin typeface="Verdana" panose="020B0604030504040204" pitchFamily="34" charset="0"/>
+                <a:ea typeface="Verdana" panose="020B0604030504040204" pitchFamily="34" charset="0"/>
+                <a:cs typeface="Verdana" panose="020B0604030504040204" pitchFamily="34" charset="0"/>
+              </a:rPr>
+              <a:t>Music Genre as label</a:t>
+            </a:r>
+          </a:p>
+          <a:p>
+            <a:pPr algn="ctr"/>
+            <a:endParaRPr lang="en-FR" sz="1100" dirty="0">
+              <a:solidFill>
+                <a:schemeClr val="bg2">
+                  <a:lumMod val="50000"/>
+                </a:schemeClr>
+              </a:solidFill>
+            </a:endParaRPr>
+          </a:p>
+        </p:txBody>
+      </p:sp>
+      <p:pic>
+        <p:nvPicPr>
+          <p:cNvPr id="33" name="Picture 32">
+            <a:extLst>
+              <a:ext uri="{FF2B5EF4-FFF2-40B4-BE49-F238E27FC236}">
+                <a16:creationId xmlns:a16="http://schemas.microsoft.com/office/drawing/2014/main" id="{C535BA83-D234-5642-B36B-668EA9AA375D}"/>
+              </a:ext>
+            </a:extLst>
+          </p:cNvPr>
+          <p:cNvPicPr>
+            <a:picLocks noChangeAspect="1"/>
+          </p:cNvPicPr>
+          <p:nvPr/>
+        </p:nvPicPr>
+        <p:blipFill>
+          <a:blip r:embed="rId7"/>
+          <a:stretch>
+            <a:fillRect/>
+          </a:stretch>
+        </p:blipFill>
+        <p:spPr>
+          <a:xfrm>
+            <a:off x="9098514" y="2318783"/>
+            <a:ext cx="2747844" cy="2747844"/>
+          </a:xfrm>
+          <a:prstGeom prst="rect">
+            <a:avLst/>
+          </a:prstGeom>
+        </p:spPr>
+      </p:pic>
+      <p:sp>
+        <p:nvSpPr>
+          <p:cNvPr id="35" name="TextBox 34">
+            <a:extLst>
+              <a:ext uri="{FF2B5EF4-FFF2-40B4-BE49-F238E27FC236}">
+                <a16:creationId xmlns:a16="http://schemas.microsoft.com/office/drawing/2014/main" id="{65509FEA-F791-DE4B-98B5-F5A82C55FB52}"/>
+              </a:ext>
+            </a:extLst>
+          </p:cNvPr>
+          <p:cNvSpPr txBox="1"/>
+          <p:nvPr/>
+        </p:nvSpPr>
+        <p:spPr>
+          <a:xfrm>
+            <a:off x="9219249" y="297072"/>
+            <a:ext cx="2145323" cy="369332"/>
+          </a:xfrm>
+          <a:prstGeom prst="rect">
+            <a:avLst/>
+          </a:prstGeom>
+          <a:noFill/>
+        </p:spPr>
+        <p:txBody>
+          <a:bodyPr wrap="square" rtlCol="0">
+            <a:spAutoFit/>
+          </a:bodyPr>
+          <a:lstStyle/>
+          <a:p>
+            <a:r>
+              <a:rPr lang="en-FR" dirty="0"/>
+              <a:t>Single .CSV Dataset</a:t>
+            </a:r>
+          </a:p>
+        </p:txBody>
+      </p:sp>
+      <p:sp>
+        <p:nvSpPr>
+          <p:cNvPr id="36" name="TextBox 35">
+            <a:extLst>
+              <a:ext uri="{FF2B5EF4-FFF2-40B4-BE49-F238E27FC236}">
+                <a16:creationId xmlns:a16="http://schemas.microsoft.com/office/drawing/2014/main" id="{E6C66B13-4AB3-4B4E-B0C2-0003865CB72E}"/>
+              </a:ext>
+            </a:extLst>
+          </p:cNvPr>
+          <p:cNvSpPr txBox="1"/>
+          <p:nvPr/>
+        </p:nvSpPr>
+        <p:spPr>
+          <a:xfrm>
+            <a:off x="4496954" y="930572"/>
+            <a:ext cx="4555153" cy="1477328"/>
+          </a:xfrm>
+          <a:prstGeom prst="rect">
+            <a:avLst/>
+          </a:prstGeom>
+          <a:noFill/>
+        </p:spPr>
+        <p:txBody>
+          <a:bodyPr wrap="square" rtlCol="0">
+            <a:spAutoFit/>
+          </a:bodyPr>
+          <a:lstStyle/>
+          <a:p>
+            <a:pPr fontAlgn="base"/>
+            <a:r>
+              <a:rPr lang="en-GB" dirty="0">
+                <a:solidFill>
+                  <a:schemeClr val="bg2">
+                    <a:lumMod val="50000"/>
+                  </a:schemeClr>
+                </a:solidFill>
+                <a:latin typeface="Anonymice Powerline" panose="02060609030202000504" pitchFamily="49" charset="0"/>
+                <a:ea typeface="Anonymice Powerline" panose="02060609030202000504" pitchFamily="49" charset="0"/>
+              </a:rPr>
+              <a:t>Zero crossing rate</a:t>
+            </a:r>
+          </a:p>
+          <a:p>
+            <a:pPr fontAlgn="base"/>
+            <a:r>
+              <a:rPr lang="en-GB" dirty="0">
+                <a:solidFill>
+                  <a:schemeClr val="bg2">
+                    <a:lumMod val="50000"/>
+                  </a:schemeClr>
+                </a:solidFill>
+                <a:latin typeface="Anonymice Powerline" panose="02060609030202000504" pitchFamily="49" charset="0"/>
+                <a:ea typeface="Anonymice Powerline" panose="02060609030202000504" pitchFamily="49" charset="0"/>
+              </a:rPr>
+              <a:t>Spectral centroid</a:t>
+            </a:r>
+          </a:p>
+          <a:p>
+            <a:pPr fontAlgn="base"/>
+            <a:r>
+              <a:rPr lang="en-GB" dirty="0">
+                <a:solidFill>
+                  <a:schemeClr val="bg2">
+                    <a:lumMod val="50000"/>
+                  </a:schemeClr>
+                </a:solidFill>
+                <a:latin typeface="Anonymice Powerline" panose="02060609030202000504" pitchFamily="49" charset="0"/>
+                <a:ea typeface="Anonymice Powerline" panose="02060609030202000504" pitchFamily="49" charset="0"/>
+              </a:rPr>
+              <a:t>Spectral bandwidth</a:t>
+            </a:r>
+          </a:p>
+          <a:p>
+            <a:pPr fontAlgn="base"/>
+            <a:r>
+              <a:rPr lang="en-GB" dirty="0">
+                <a:solidFill>
+                  <a:schemeClr val="bg2">
+                    <a:lumMod val="50000"/>
+                  </a:schemeClr>
+                </a:solidFill>
+                <a:latin typeface="Anonymice Powerline" panose="02060609030202000504" pitchFamily="49" charset="0"/>
+                <a:ea typeface="Anonymice Powerline" panose="02060609030202000504" pitchFamily="49" charset="0"/>
+              </a:rPr>
+              <a:t>Spectral </a:t>
+            </a:r>
+            <a:r>
+              <a:rPr lang="en-GB" dirty="0" err="1">
+                <a:solidFill>
+                  <a:schemeClr val="bg2">
+                    <a:lumMod val="50000"/>
+                  </a:schemeClr>
+                </a:solidFill>
+                <a:latin typeface="Anonymice Powerline" panose="02060609030202000504" pitchFamily="49" charset="0"/>
+                <a:ea typeface="Anonymice Powerline" panose="02060609030202000504" pitchFamily="49" charset="0"/>
+              </a:rPr>
+              <a:t>rolloff</a:t>
+            </a:r>
+            <a:endParaRPr lang="en-GB" dirty="0">
+              <a:solidFill>
+                <a:schemeClr val="bg2">
+                  <a:lumMod val="50000"/>
+                </a:schemeClr>
+              </a:solidFill>
+              <a:latin typeface="Anonymice Powerline" panose="02060609030202000504" pitchFamily="49" charset="0"/>
+              <a:ea typeface="Anonymice Powerline" panose="02060609030202000504" pitchFamily="49" charset="0"/>
+            </a:endParaRPr>
+          </a:p>
+          <a:p>
+            <a:endParaRPr lang="en-FR" dirty="0">
+              <a:solidFill>
+                <a:schemeClr val="bg2">
+                  <a:lumMod val="50000"/>
+                </a:schemeClr>
+              </a:solidFill>
+              <a:latin typeface="Anonymice Powerline" panose="02060609030202000504" pitchFamily="49" charset="0"/>
+              <a:ea typeface="Anonymice Powerline" panose="02060609030202000504" pitchFamily="49" charset="0"/>
+            </a:endParaRPr>
+          </a:p>
+        </p:txBody>
+      </p:sp>
+      <p:sp>
+        <p:nvSpPr>
+          <p:cNvPr id="37" name="TextBox 36">
+            <a:extLst>
+              <a:ext uri="{FF2B5EF4-FFF2-40B4-BE49-F238E27FC236}">
+                <a16:creationId xmlns:a16="http://schemas.microsoft.com/office/drawing/2014/main" id="{F4171DFA-1B37-694A-B8E7-8D17E4376E49}"/>
+              </a:ext>
+            </a:extLst>
+          </p:cNvPr>
+          <p:cNvSpPr txBox="1"/>
+          <p:nvPr/>
+        </p:nvSpPr>
+        <p:spPr>
+          <a:xfrm>
+            <a:off x="4496954" y="5027298"/>
+            <a:ext cx="4555153" cy="1754326"/>
+          </a:xfrm>
+          <a:prstGeom prst="rect">
+            <a:avLst/>
+          </a:prstGeom>
+          <a:noFill/>
+        </p:spPr>
+        <p:txBody>
+          <a:bodyPr wrap="square" rtlCol="0">
+            <a:spAutoFit/>
+          </a:bodyPr>
+          <a:lstStyle/>
+          <a:p>
+            <a:pPr fontAlgn="base"/>
+            <a:r>
+              <a:rPr lang="en-GB" dirty="0">
+                <a:solidFill>
+                  <a:schemeClr val="bg2">
+                    <a:lumMod val="50000"/>
+                  </a:schemeClr>
+                </a:solidFill>
+                <a:latin typeface="Anonymice Powerline" panose="02060609030202000504" pitchFamily="49" charset="0"/>
+                <a:ea typeface="Anonymice Powerline" panose="02060609030202000504" pitchFamily="49" charset="0"/>
+              </a:rPr>
+              <a:t>Mel-Frequency Cepstral Coefficients</a:t>
+            </a:r>
+          </a:p>
+          <a:p>
+            <a:pPr fontAlgn="base"/>
+            <a:r>
+              <a:rPr lang="en-GB" dirty="0">
+                <a:solidFill>
+                  <a:schemeClr val="bg2">
+                    <a:lumMod val="50000"/>
+                  </a:schemeClr>
+                </a:solidFill>
+                <a:latin typeface="Anonymice Powerline" panose="02060609030202000504" pitchFamily="49" charset="0"/>
+                <a:ea typeface="Anonymice Powerline" panose="02060609030202000504" pitchFamily="49" charset="0"/>
+              </a:rPr>
+              <a:t>Chroma frequencies</a:t>
+            </a:r>
+          </a:p>
+          <a:p>
+            <a:pPr fontAlgn="base"/>
+            <a:r>
+              <a:rPr lang="en-GB" dirty="0">
+                <a:solidFill>
+                  <a:schemeClr val="bg2">
+                    <a:lumMod val="50000"/>
+                  </a:schemeClr>
+                </a:solidFill>
+                <a:latin typeface="Anonymice Powerline" panose="02060609030202000504" pitchFamily="49" charset="0"/>
+                <a:ea typeface="Anonymice Powerline" panose="02060609030202000504" pitchFamily="49" charset="0"/>
+              </a:rPr>
+              <a:t>RMSE (Root Mean Square Energy)</a:t>
+            </a:r>
+          </a:p>
+          <a:p>
+            <a:pPr fontAlgn="base"/>
+            <a:r>
+              <a:rPr lang="en-GB" dirty="0">
+                <a:solidFill>
+                  <a:schemeClr val="bg2">
+                    <a:lumMod val="50000"/>
+                  </a:schemeClr>
+                </a:solidFill>
+                <a:latin typeface="Anonymice Powerline" panose="02060609030202000504" pitchFamily="49" charset="0"/>
+                <a:ea typeface="Anonymice Powerline" panose="02060609030202000504" pitchFamily="49" charset="0"/>
+              </a:rPr>
+              <a:t>Etc…</a:t>
+            </a:r>
+          </a:p>
+          <a:p>
+            <a:endParaRPr lang="en-FR" dirty="0">
+              <a:latin typeface="Anonymice Powerline" panose="02060609030202000504" pitchFamily="49" charset="0"/>
+              <a:ea typeface="Anonymice Powerline" panose="02060609030202000504" pitchFamily="49" charset="0"/>
+            </a:endParaRPr>
+          </a:p>
+        </p:txBody>
+      </p:sp>
+    </p:spTree>
+    <p:extLst>
+      <p:ext uri="{BB962C8B-B14F-4D97-AF65-F5344CB8AC3E}">
+        <p14:creationId xmlns:p14="http://schemas.microsoft.com/office/powerpoint/2010/main" val="2053912476"/>
       </p:ext>
     </p:extLst>
   </p:cSld>

</xml_diff>

<commit_message>
Removed manual testing audio tracks from repo
</commit_message>
<xml_diff>
--- a/docs/DocumentationFigures.pptx
+++ b/docs/DocumentationFigures.pptx
@@ -5,12 +5,13 @@
     <p:sldMasterId id="2147483648" r:id="rId1"/>
   </p:sldMasterIdLst>
   <p:notesMasterIdLst>
-    <p:notesMasterId r:id="rId5"/>
+    <p:notesMasterId r:id="rId6"/>
   </p:notesMasterIdLst>
   <p:sldIdLst>
     <p:sldId id="256" r:id="rId2"/>
     <p:sldId id="258" r:id="rId3"/>
     <p:sldId id="259" r:id="rId4"/>
+    <p:sldId id="260" r:id="rId5"/>
   </p:sldIdLst>
   <p:sldSz cx="12192000" cy="6858000"/>
   <p:notesSz cx="6858000" cy="9144000"/>
@@ -710,6 +711,90 @@
     <p:extLst>
       <p:ext uri="{BB962C8B-B14F-4D97-AF65-F5344CB8AC3E}">
         <p14:creationId xmlns:p14="http://schemas.microsoft.com/office/powerpoint/2010/main" val="3878623092"/>
+      </p:ext>
+    </p:extLst>
+  </p:cSld>
+  <p:clrMapOvr>
+    <a:masterClrMapping/>
+  </p:clrMapOvr>
+</p:notes>
+</file>
+
+<file path=ppt/notesSlides/notesSlide4.xml><?xml version="1.0" encoding="utf-8"?>
+<p:notes xmlns:a="http://schemas.openxmlformats.org/drawingml/2006/main" xmlns:r="http://schemas.openxmlformats.org/officeDocument/2006/relationships" xmlns:p="http://schemas.openxmlformats.org/presentationml/2006/main">
+  <p:cSld>
+    <p:spTree>
+      <p:nvGrpSpPr>
+        <p:cNvPr id="1" name=""/>
+        <p:cNvGrpSpPr/>
+        <p:nvPr/>
+      </p:nvGrpSpPr>
+      <p:grpSpPr>
+        <a:xfrm>
+          <a:off x="0" y="0"/>
+          <a:ext cx="0" cy="0"/>
+          <a:chOff x="0" y="0"/>
+          <a:chExt cx="0" cy="0"/>
+        </a:xfrm>
+      </p:grpSpPr>
+      <p:sp>
+        <p:nvSpPr>
+          <p:cNvPr id="2" name="Slide Image Placeholder 1"/>
+          <p:cNvSpPr>
+            <a:spLocks noGrp="1" noRot="1" noChangeAspect="1"/>
+          </p:cNvSpPr>
+          <p:nvPr>
+            <p:ph type="sldImg"/>
+          </p:nvPr>
+        </p:nvSpPr>
+        <p:spPr/>
+      </p:sp>
+      <p:sp>
+        <p:nvSpPr>
+          <p:cNvPr id="3" name="Notes Placeholder 2"/>
+          <p:cNvSpPr>
+            <a:spLocks noGrp="1"/>
+          </p:cNvSpPr>
+          <p:nvPr>
+            <p:ph type="body" idx="1"/>
+          </p:nvPr>
+        </p:nvSpPr>
+        <p:spPr/>
+        <p:txBody>
+          <a:bodyPr/>
+          <a:lstStyle/>
+          <a:p>
+            <a:endParaRPr lang="en-FR" dirty="0"/>
+          </a:p>
+        </p:txBody>
+      </p:sp>
+      <p:sp>
+        <p:nvSpPr>
+          <p:cNvPr id="4" name="Slide Number Placeholder 3"/>
+          <p:cNvSpPr>
+            <a:spLocks noGrp="1"/>
+          </p:cNvSpPr>
+          <p:nvPr>
+            <p:ph type="sldNum" sz="quarter" idx="5"/>
+          </p:nvPr>
+        </p:nvSpPr>
+        <p:spPr/>
+        <p:txBody>
+          <a:bodyPr/>
+          <a:lstStyle/>
+          <a:p>
+            <a:fld id="{3D527973-9C1D-8D48-8832-8644C23AAA6A}" type="slidenum">
+              <a:rPr lang="en-FR" smtClean="0"/>
+              <a:t>4</a:t>
+            </a:fld>
+            <a:endParaRPr lang="en-FR"/>
+          </a:p>
+        </p:txBody>
+      </p:sp>
+    </p:spTree>
+    <p:extLst>
+      <p:ext uri="{BB962C8B-B14F-4D97-AF65-F5344CB8AC3E}">
+        <p14:creationId xmlns:p14="http://schemas.microsoft.com/office/powerpoint/2010/main" val="2212070044"/>
       </p:ext>
     </p:extLst>
   </p:cSld>
@@ -7885,6 +7970,927 @@
     <p:extLst>
       <p:ext uri="{BB962C8B-B14F-4D97-AF65-F5344CB8AC3E}">
         <p14:creationId xmlns:p14="http://schemas.microsoft.com/office/powerpoint/2010/main" val="2053912476"/>
+      </p:ext>
+    </p:extLst>
+  </p:cSld>
+  <p:clrMapOvr>
+    <a:masterClrMapping/>
+  </p:clrMapOvr>
+</p:sld>
+</file>
+
+<file path=ppt/slides/slide4.xml><?xml version="1.0" encoding="utf-8"?>
+<p:sld xmlns:a="http://schemas.openxmlformats.org/drawingml/2006/main" xmlns:r="http://schemas.openxmlformats.org/officeDocument/2006/relationships" xmlns:p="http://schemas.openxmlformats.org/presentationml/2006/main">
+  <p:cSld>
+    <p:spTree>
+      <p:nvGrpSpPr>
+        <p:cNvPr id="1" name=""/>
+        <p:cNvGrpSpPr/>
+        <p:nvPr/>
+      </p:nvGrpSpPr>
+      <p:grpSpPr>
+        <a:xfrm>
+          <a:off x="0" y="0"/>
+          <a:ext cx="0" cy="0"/>
+          <a:chOff x="0" y="0"/>
+          <a:chExt cx="0" cy="0"/>
+        </a:xfrm>
+      </p:grpSpPr>
+      <p:sp>
+        <p:nvSpPr>
+          <p:cNvPr id="4" name="TextBox 3">
+            <a:extLst>
+              <a:ext uri="{FF2B5EF4-FFF2-40B4-BE49-F238E27FC236}">
+                <a16:creationId xmlns:a16="http://schemas.microsoft.com/office/drawing/2014/main" id="{4C2210E9-A828-614B-B551-24EC7B6BE3E8}"/>
+              </a:ext>
+            </a:extLst>
+          </p:cNvPr>
+          <p:cNvSpPr txBox="1"/>
+          <p:nvPr/>
+        </p:nvSpPr>
+        <p:spPr>
+          <a:xfrm>
+            <a:off x="827428" y="421182"/>
+            <a:ext cx="2145323" cy="369332"/>
+          </a:xfrm>
+          <a:prstGeom prst="rect">
+            <a:avLst/>
+          </a:prstGeom>
+          <a:noFill/>
+        </p:spPr>
+        <p:txBody>
+          <a:bodyPr wrap="square" rtlCol="0">
+            <a:spAutoFit/>
+          </a:bodyPr>
+          <a:lstStyle/>
+          <a:p>
+            <a:r>
+              <a:rPr lang="en-FR" dirty="0"/>
+              <a:t>Input</a:t>
+            </a:r>
+          </a:p>
+        </p:txBody>
+      </p:sp>
+      <p:pic>
+        <p:nvPicPr>
+          <p:cNvPr id="9" name="Picture 8">
+            <a:extLst>
+              <a:ext uri="{FF2B5EF4-FFF2-40B4-BE49-F238E27FC236}">
+                <a16:creationId xmlns:a16="http://schemas.microsoft.com/office/drawing/2014/main" id="{5C2F5C08-54F6-0C43-97B9-E0B95E1931FC}"/>
+              </a:ext>
+            </a:extLst>
+          </p:cNvPr>
+          <p:cNvPicPr>
+            <a:picLocks noChangeAspect="1"/>
+          </p:cNvPicPr>
+          <p:nvPr/>
+        </p:nvPicPr>
+        <p:blipFill>
+          <a:blip r:embed="rId3"/>
+          <a:stretch>
+            <a:fillRect/>
+          </a:stretch>
+        </p:blipFill>
+        <p:spPr>
+          <a:xfrm>
+            <a:off x="463817" y="3143932"/>
+            <a:ext cx="1784434" cy="1427546"/>
+          </a:xfrm>
+          <a:prstGeom prst="rect">
+            <a:avLst/>
+          </a:prstGeom>
+        </p:spPr>
+      </p:pic>
+      <p:sp>
+        <p:nvSpPr>
+          <p:cNvPr id="26" name="Right Arrow 25">
+            <a:extLst>
+              <a:ext uri="{FF2B5EF4-FFF2-40B4-BE49-F238E27FC236}">
+                <a16:creationId xmlns:a16="http://schemas.microsoft.com/office/drawing/2014/main" id="{00DA3D30-60B5-3744-B457-C1A576E6CD4D}"/>
+              </a:ext>
+            </a:extLst>
+          </p:cNvPr>
+          <p:cNvSpPr/>
+          <p:nvPr/>
+        </p:nvSpPr>
+        <p:spPr>
+          <a:xfrm>
+            <a:off x="4768316" y="2411841"/>
+            <a:ext cx="2233203" cy="2481202"/>
+          </a:xfrm>
+          <a:prstGeom prst="rightArrow">
+            <a:avLst>
+              <a:gd name="adj1" fmla="val 50000"/>
+              <a:gd name="adj2" fmla="val 21001"/>
+            </a:avLst>
+          </a:prstGeom>
+          <a:solidFill>
+            <a:schemeClr val="accent4">
+              <a:lumMod val="60000"/>
+              <a:lumOff val="40000"/>
+            </a:schemeClr>
+          </a:solidFill>
+          <a:ln>
+            <a:noFill/>
+          </a:ln>
+        </p:spPr>
+        <p:style>
+          <a:lnRef idx="2">
+            <a:schemeClr val="accent1">
+              <a:shade val="50000"/>
+            </a:schemeClr>
+          </a:lnRef>
+          <a:fillRef idx="1">
+            <a:schemeClr val="accent1"/>
+          </a:fillRef>
+          <a:effectRef idx="0">
+            <a:schemeClr val="accent1"/>
+          </a:effectRef>
+          <a:fontRef idx="minor">
+            <a:schemeClr val="lt1"/>
+          </a:fontRef>
+        </p:style>
+        <p:txBody>
+          <a:bodyPr rtlCol="0" anchor="ctr"/>
+          <a:lstStyle/>
+          <a:p>
+            <a:pPr algn="ctr"/>
+            <a:r>
+              <a:rPr lang="en-FR" sz="2000" dirty="0">
+                <a:latin typeface="Helvetica" pitchFamily="2" charset="0"/>
+              </a:rPr>
+              <a:t>Machine Learning Classifier</a:t>
+            </a:r>
+          </a:p>
+        </p:txBody>
+      </p:sp>
+      <p:sp>
+        <p:nvSpPr>
+          <p:cNvPr id="35" name="TextBox 34">
+            <a:extLst>
+              <a:ext uri="{FF2B5EF4-FFF2-40B4-BE49-F238E27FC236}">
+                <a16:creationId xmlns:a16="http://schemas.microsoft.com/office/drawing/2014/main" id="{65509FEA-F791-DE4B-98B5-F5A82C55FB52}"/>
+              </a:ext>
+            </a:extLst>
+          </p:cNvPr>
+          <p:cNvSpPr txBox="1"/>
+          <p:nvPr/>
+        </p:nvSpPr>
+        <p:spPr>
+          <a:xfrm>
+            <a:off x="10789865" y="51850"/>
+            <a:ext cx="2145323" cy="369332"/>
+          </a:xfrm>
+          <a:prstGeom prst="rect">
+            <a:avLst/>
+          </a:prstGeom>
+          <a:noFill/>
+        </p:spPr>
+        <p:txBody>
+          <a:bodyPr wrap="square" rtlCol="0">
+            <a:spAutoFit/>
+          </a:bodyPr>
+          <a:lstStyle/>
+          <a:p>
+            <a:r>
+              <a:rPr lang="en-FR" dirty="0"/>
+              <a:t>Output</a:t>
+            </a:r>
+          </a:p>
+        </p:txBody>
+      </p:sp>
+      <p:sp>
+        <p:nvSpPr>
+          <p:cNvPr id="30" name="Rounded Rectangle 29">
+            <a:extLst>
+              <a:ext uri="{FF2B5EF4-FFF2-40B4-BE49-F238E27FC236}">
+                <a16:creationId xmlns:a16="http://schemas.microsoft.com/office/drawing/2014/main" id="{6C1DB8F5-A2AB-AF45-BCE5-5EEB3B3A3C21}"/>
+              </a:ext>
+            </a:extLst>
+          </p:cNvPr>
+          <p:cNvSpPr/>
+          <p:nvPr/>
+        </p:nvSpPr>
+        <p:spPr>
+          <a:xfrm>
+            <a:off x="7322764" y="5624002"/>
+            <a:ext cx="2643743" cy="496530"/>
+          </a:xfrm>
+          <a:prstGeom prst="roundRect">
+            <a:avLst/>
+          </a:prstGeom>
+          <a:solidFill>
+            <a:schemeClr val="accent2"/>
+          </a:solidFill>
+        </p:spPr>
+        <p:style>
+          <a:lnRef idx="2">
+            <a:schemeClr val="accent1">
+              <a:shade val="50000"/>
+            </a:schemeClr>
+          </a:lnRef>
+          <a:fillRef idx="1">
+            <a:schemeClr val="accent1"/>
+          </a:fillRef>
+          <a:effectRef idx="0">
+            <a:schemeClr val="accent1"/>
+          </a:effectRef>
+          <a:fontRef idx="minor">
+            <a:schemeClr val="lt1"/>
+          </a:fontRef>
+        </p:style>
+        <p:txBody>
+          <a:bodyPr rtlCol="0" anchor="ctr"/>
+          <a:lstStyle/>
+          <a:p>
+            <a:pPr algn="ctr"/>
+            <a:r>
+              <a:rPr lang="fr-FR" dirty="0"/>
+              <a:t>rock</a:t>
+            </a:r>
+            <a:endParaRPr lang="en-FR" dirty="0"/>
+          </a:p>
+        </p:txBody>
+      </p:sp>
+      <p:sp>
+        <p:nvSpPr>
+          <p:cNvPr id="34" name="Rounded Rectangle 33">
+            <a:extLst>
+              <a:ext uri="{FF2B5EF4-FFF2-40B4-BE49-F238E27FC236}">
+                <a16:creationId xmlns:a16="http://schemas.microsoft.com/office/drawing/2014/main" id="{1DCA7F18-A835-484E-B99F-BA6E567CDF0D}"/>
+              </a:ext>
+            </a:extLst>
+          </p:cNvPr>
+          <p:cNvSpPr/>
+          <p:nvPr/>
+        </p:nvSpPr>
+        <p:spPr>
+          <a:xfrm>
+            <a:off x="7322773" y="6202960"/>
+            <a:ext cx="2643743" cy="496530"/>
+          </a:xfrm>
+          <a:prstGeom prst="roundRect">
+            <a:avLst/>
+          </a:prstGeom>
+        </p:spPr>
+        <p:style>
+          <a:lnRef idx="2">
+            <a:schemeClr val="accent1">
+              <a:shade val="50000"/>
+            </a:schemeClr>
+          </a:lnRef>
+          <a:fillRef idx="1">
+            <a:schemeClr val="accent1"/>
+          </a:fillRef>
+          <a:effectRef idx="0">
+            <a:schemeClr val="accent1"/>
+          </a:effectRef>
+          <a:fontRef idx="minor">
+            <a:schemeClr val="lt1"/>
+          </a:fontRef>
+        </p:style>
+        <p:txBody>
+          <a:bodyPr rtlCol="0" anchor="ctr"/>
+          <a:lstStyle/>
+          <a:p>
+            <a:pPr algn="ctr"/>
+            <a:r>
+              <a:rPr lang="en-GB" dirty="0"/>
+              <a:t>b</a:t>
+            </a:r>
+            <a:r>
+              <a:rPr lang="en-FR" dirty="0"/>
+              <a:t>lues</a:t>
+            </a:r>
+          </a:p>
+        </p:txBody>
+      </p:sp>
+      <p:sp>
+        <p:nvSpPr>
+          <p:cNvPr id="38" name="Rounded Rectangle 37">
+            <a:extLst>
+              <a:ext uri="{FF2B5EF4-FFF2-40B4-BE49-F238E27FC236}">
+                <a16:creationId xmlns:a16="http://schemas.microsoft.com/office/drawing/2014/main" id="{F9088FB0-22A8-5C4B-977E-FA6C80E1A390}"/>
+              </a:ext>
+            </a:extLst>
+          </p:cNvPr>
+          <p:cNvSpPr/>
+          <p:nvPr/>
+        </p:nvSpPr>
+        <p:spPr>
+          <a:xfrm>
+            <a:off x="7322765" y="5035315"/>
+            <a:ext cx="2643743" cy="496530"/>
+          </a:xfrm>
+          <a:prstGeom prst="roundRect">
+            <a:avLst/>
+          </a:prstGeom>
+          <a:solidFill>
+            <a:srgbClr val="7030A0"/>
+          </a:solidFill>
+        </p:spPr>
+        <p:style>
+          <a:lnRef idx="2">
+            <a:schemeClr val="accent1">
+              <a:shade val="50000"/>
+            </a:schemeClr>
+          </a:lnRef>
+          <a:fillRef idx="1">
+            <a:schemeClr val="accent1"/>
+          </a:fillRef>
+          <a:effectRef idx="0">
+            <a:schemeClr val="accent1"/>
+          </a:effectRef>
+          <a:fontRef idx="minor">
+            <a:schemeClr val="lt1"/>
+          </a:fontRef>
+        </p:style>
+        <p:txBody>
+          <a:bodyPr rtlCol="0" anchor="ctr"/>
+          <a:lstStyle/>
+          <a:p>
+            <a:pPr algn="ctr"/>
+            <a:r>
+              <a:rPr lang="fr-FR" dirty="0"/>
+              <a:t>hiphop</a:t>
+            </a:r>
+            <a:endParaRPr lang="en-FR" dirty="0"/>
+          </a:p>
+        </p:txBody>
+      </p:sp>
+      <p:sp>
+        <p:nvSpPr>
+          <p:cNvPr id="39" name="Rounded Rectangle 38">
+            <a:extLst>
+              <a:ext uri="{FF2B5EF4-FFF2-40B4-BE49-F238E27FC236}">
+                <a16:creationId xmlns:a16="http://schemas.microsoft.com/office/drawing/2014/main" id="{4895CECB-25F6-CC4B-9B0B-63D2D5BEC1B3}"/>
+              </a:ext>
+            </a:extLst>
+          </p:cNvPr>
+          <p:cNvSpPr/>
+          <p:nvPr/>
+        </p:nvSpPr>
+        <p:spPr>
+          <a:xfrm>
+            <a:off x="7322764" y="4412660"/>
+            <a:ext cx="2643743" cy="496530"/>
+          </a:xfrm>
+          <a:prstGeom prst="roundRect">
+            <a:avLst/>
+          </a:prstGeom>
+          <a:solidFill>
+            <a:schemeClr val="accent1">
+              <a:lumMod val="60000"/>
+              <a:lumOff val="40000"/>
+            </a:schemeClr>
+          </a:solidFill>
+        </p:spPr>
+        <p:style>
+          <a:lnRef idx="2">
+            <a:schemeClr val="accent1">
+              <a:shade val="50000"/>
+            </a:schemeClr>
+          </a:lnRef>
+          <a:fillRef idx="1">
+            <a:schemeClr val="accent1"/>
+          </a:fillRef>
+          <a:effectRef idx="0">
+            <a:schemeClr val="accent1"/>
+          </a:effectRef>
+          <a:fontRef idx="minor">
+            <a:schemeClr val="lt1"/>
+          </a:fontRef>
+        </p:style>
+        <p:txBody>
+          <a:bodyPr rtlCol="0" anchor="ctr"/>
+          <a:lstStyle/>
+          <a:p>
+            <a:pPr algn="ctr"/>
+            <a:r>
+              <a:rPr lang="fr-FR" dirty="0"/>
+              <a:t>blues</a:t>
+            </a:r>
+            <a:endParaRPr lang="en-FR" dirty="0"/>
+          </a:p>
+        </p:txBody>
+      </p:sp>
+      <p:sp>
+        <p:nvSpPr>
+          <p:cNvPr id="40" name="Rounded Rectangle 39">
+            <a:extLst>
+              <a:ext uri="{FF2B5EF4-FFF2-40B4-BE49-F238E27FC236}">
+                <a16:creationId xmlns:a16="http://schemas.microsoft.com/office/drawing/2014/main" id="{2546548B-D730-BA49-9B25-58195020D663}"/>
+              </a:ext>
+            </a:extLst>
+          </p:cNvPr>
+          <p:cNvSpPr/>
+          <p:nvPr/>
+        </p:nvSpPr>
+        <p:spPr>
+          <a:xfrm>
+            <a:off x="7322766" y="3795063"/>
+            <a:ext cx="2643743" cy="496530"/>
+          </a:xfrm>
+          <a:prstGeom prst="roundRect">
+            <a:avLst/>
+          </a:prstGeom>
+          <a:solidFill>
+            <a:schemeClr val="accent4"/>
+          </a:solidFill>
+        </p:spPr>
+        <p:style>
+          <a:lnRef idx="2">
+            <a:schemeClr val="accent1">
+              <a:shade val="50000"/>
+            </a:schemeClr>
+          </a:lnRef>
+          <a:fillRef idx="1">
+            <a:schemeClr val="accent1"/>
+          </a:fillRef>
+          <a:effectRef idx="0">
+            <a:schemeClr val="accent1"/>
+          </a:effectRef>
+          <a:fontRef idx="minor">
+            <a:schemeClr val="lt1"/>
+          </a:fontRef>
+        </p:style>
+        <p:txBody>
+          <a:bodyPr rtlCol="0" anchor="ctr"/>
+          <a:lstStyle/>
+          <a:p>
+            <a:pPr algn="ctr"/>
+            <a:r>
+              <a:rPr lang="fr-FR" dirty="0" err="1"/>
+              <a:t>classical</a:t>
+            </a:r>
+            <a:endParaRPr lang="en-FR" dirty="0"/>
+          </a:p>
+        </p:txBody>
+      </p:sp>
+      <p:sp>
+        <p:nvSpPr>
+          <p:cNvPr id="41" name="Rounded Rectangle 40">
+            <a:extLst>
+              <a:ext uri="{FF2B5EF4-FFF2-40B4-BE49-F238E27FC236}">
+                <a16:creationId xmlns:a16="http://schemas.microsoft.com/office/drawing/2014/main" id="{FC43F363-8E67-1647-A6D6-D14EC3C5FD8B}"/>
+              </a:ext>
+            </a:extLst>
+          </p:cNvPr>
+          <p:cNvSpPr/>
+          <p:nvPr/>
+        </p:nvSpPr>
+        <p:spPr>
+          <a:xfrm>
+            <a:off x="7322767" y="3188071"/>
+            <a:ext cx="2643743" cy="496530"/>
+          </a:xfrm>
+          <a:prstGeom prst="roundRect">
+            <a:avLst/>
+          </a:prstGeom>
+          <a:solidFill>
+            <a:srgbClr val="FFA1F5"/>
+          </a:solidFill>
+        </p:spPr>
+        <p:style>
+          <a:lnRef idx="2">
+            <a:schemeClr val="accent1">
+              <a:shade val="50000"/>
+            </a:schemeClr>
+          </a:lnRef>
+          <a:fillRef idx="1">
+            <a:schemeClr val="accent1"/>
+          </a:fillRef>
+          <a:effectRef idx="0">
+            <a:schemeClr val="accent1"/>
+          </a:effectRef>
+          <a:fontRef idx="minor">
+            <a:schemeClr val="lt1"/>
+          </a:fontRef>
+        </p:style>
+        <p:txBody>
+          <a:bodyPr rtlCol="0" anchor="ctr"/>
+          <a:lstStyle/>
+          <a:p>
+            <a:pPr algn="ctr"/>
+            <a:r>
+              <a:rPr lang="fr-FR" dirty="0"/>
+              <a:t>pop</a:t>
+            </a:r>
+            <a:endParaRPr lang="en-FR" dirty="0"/>
+          </a:p>
+        </p:txBody>
+      </p:sp>
+      <p:sp>
+        <p:nvSpPr>
+          <p:cNvPr id="42" name="Rounded Rectangle 41">
+            <a:extLst>
+              <a:ext uri="{FF2B5EF4-FFF2-40B4-BE49-F238E27FC236}">
+                <a16:creationId xmlns:a16="http://schemas.microsoft.com/office/drawing/2014/main" id="{A9192976-E380-524E-B01C-4E5E1919CCBD}"/>
+              </a:ext>
+            </a:extLst>
+          </p:cNvPr>
+          <p:cNvSpPr/>
+          <p:nvPr/>
+        </p:nvSpPr>
+        <p:spPr>
+          <a:xfrm>
+            <a:off x="7322767" y="2581079"/>
+            <a:ext cx="2643743" cy="496530"/>
+          </a:xfrm>
+          <a:prstGeom prst="roundRect">
+            <a:avLst/>
+          </a:prstGeom>
+          <a:solidFill>
+            <a:schemeClr val="accent6">
+              <a:lumMod val="75000"/>
+            </a:schemeClr>
+          </a:solidFill>
+        </p:spPr>
+        <p:style>
+          <a:lnRef idx="2">
+            <a:schemeClr val="accent1">
+              <a:shade val="50000"/>
+            </a:schemeClr>
+          </a:lnRef>
+          <a:fillRef idx="1">
+            <a:schemeClr val="accent1"/>
+          </a:fillRef>
+          <a:effectRef idx="0">
+            <a:schemeClr val="accent1"/>
+          </a:effectRef>
+          <a:fontRef idx="minor">
+            <a:schemeClr val="lt1"/>
+          </a:fontRef>
+        </p:style>
+        <p:txBody>
+          <a:bodyPr rtlCol="0" anchor="ctr"/>
+          <a:lstStyle/>
+          <a:p>
+            <a:pPr algn="ctr"/>
+            <a:r>
+              <a:rPr lang="fr-FR" dirty="0"/>
+              <a:t>reggae</a:t>
+            </a:r>
+            <a:endParaRPr lang="en-FR" dirty="0"/>
+          </a:p>
+        </p:txBody>
+      </p:sp>
+      <p:sp>
+        <p:nvSpPr>
+          <p:cNvPr id="43" name="Rounded Rectangle 42">
+            <a:extLst>
+              <a:ext uri="{FF2B5EF4-FFF2-40B4-BE49-F238E27FC236}">
+                <a16:creationId xmlns:a16="http://schemas.microsoft.com/office/drawing/2014/main" id="{14AD62BF-7784-3F40-B1CF-14A1FFF7FDE0}"/>
+              </a:ext>
+            </a:extLst>
+          </p:cNvPr>
+          <p:cNvSpPr/>
+          <p:nvPr/>
+        </p:nvSpPr>
+        <p:spPr>
+          <a:xfrm>
+            <a:off x="7322768" y="1974087"/>
+            <a:ext cx="2643743" cy="496530"/>
+          </a:xfrm>
+          <a:prstGeom prst="roundRect">
+            <a:avLst/>
+          </a:prstGeom>
+          <a:solidFill>
+            <a:schemeClr val="tx2">
+              <a:lumMod val="60000"/>
+              <a:lumOff val="40000"/>
+            </a:schemeClr>
+          </a:solidFill>
+        </p:spPr>
+        <p:style>
+          <a:lnRef idx="2">
+            <a:schemeClr val="accent1">
+              <a:shade val="50000"/>
+            </a:schemeClr>
+          </a:lnRef>
+          <a:fillRef idx="1">
+            <a:schemeClr val="accent1"/>
+          </a:fillRef>
+          <a:effectRef idx="0">
+            <a:schemeClr val="accent1"/>
+          </a:effectRef>
+          <a:fontRef idx="minor">
+            <a:schemeClr val="lt1"/>
+          </a:fontRef>
+        </p:style>
+        <p:txBody>
+          <a:bodyPr rtlCol="0" anchor="ctr"/>
+          <a:lstStyle/>
+          <a:p>
+            <a:pPr algn="ctr"/>
+            <a:r>
+              <a:rPr lang="en-FR" dirty="0"/>
+              <a:t>disco</a:t>
+            </a:r>
+          </a:p>
+        </p:txBody>
+      </p:sp>
+      <p:sp>
+        <p:nvSpPr>
+          <p:cNvPr id="44" name="Rounded Rectangle 43">
+            <a:extLst>
+              <a:ext uri="{FF2B5EF4-FFF2-40B4-BE49-F238E27FC236}">
+                <a16:creationId xmlns:a16="http://schemas.microsoft.com/office/drawing/2014/main" id="{0DEF0E73-AEC1-3C41-A765-13D921F6DDE6}"/>
+              </a:ext>
+            </a:extLst>
+          </p:cNvPr>
+          <p:cNvSpPr/>
+          <p:nvPr/>
+        </p:nvSpPr>
+        <p:spPr>
+          <a:xfrm>
+            <a:off x="7322767" y="1379201"/>
+            <a:ext cx="2643743" cy="496530"/>
+          </a:xfrm>
+          <a:prstGeom prst="roundRect">
+            <a:avLst/>
+          </a:prstGeom>
+          <a:solidFill>
+            <a:srgbClr val="AF0000">
+              <a:alpha val="81961"/>
+            </a:srgbClr>
+          </a:solidFill>
+        </p:spPr>
+        <p:style>
+          <a:lnRef idx="2">
+            <a:schemeClr val="accent1">
+              <a:shade val="50000"/>
+            </a:schemeClr>
+          </a:lnRef>
+          <a:fillRef idx="1">
+            <a:schemeClr val="accent1"/>
+          </a:fillRef>
+          <a:effectRef idx="0">
+            <a:schemeClr val="accent1"/>
+          </a:effectRef>
+          <a:fontRef idx="minor">
+            <a:schemeClr val="lt1"/>
+          </a:fontRef>
+        </p:style>
+        <p:txBody>
+          <a:bodyPr rtlCol="0" anchor="ctr"/>
+          <a:lstStyle/>
+          <a:p>
+            <a:pPr algn="ctr"/>
+            <a:r>
+              <a:rPr lang="en-FR" dirty="0"/>
+              <a:t>jazz</a:t>
+            </a:r>
+          </a:p>
+        </p:txBody>
+      </p:sp>
+      <p:sp>
+        <p:nvSpPr>
+          <p:cNvPr id="2" name="TextBox 1">
+            <a:extLst>
+              <a:ext uri="{FF2B5EF4-FFF2-40B4-BE49-F238E27FC236}">
+                <a16:creationId xmlns:a16="http://schemas.microsoft.com/office/drawing/2014/main" id="{848AD1B8-03F6-E14C-AE63-6D70565CE5D6}"/>
+              </a:ext>
+            </a:extLst>
+          </p:cNvPr>
+          <p:cNvSpPr txBox="1"/>
+          <p:nvPr/>
+        </p:nvSpPr>
+        <p:spPr>
+          <a:xfrm>
+            <a:off x="108724" y="4660925"/>
+            <a:ext cx="2425859" cy="369332"/>
+          </a:xfrm>
+          <a:prstGeom prst="rect">
+            <a:avLst/>
+          </a:prstGeom>
+          <a:noFill/>
+        </p:spPr>
+        <p:txBody>
+          <a:bodyPr wrap="square" rtlCol="0">
+            <a:spAutoFit/>
+          </a:bodyPr>
+          <a:lstStyle/>
+          <a:p>
+            <a:r>
+              <a:rPr lang="en-FR" dirty="0"/>
+              <a:t>“ Lacrimosa by Mozart “</a:t>
+            </a:r>
+          </a:p>
+        </p:txBody>
+      </p:sp>
+      <p:sp>
+        <p:nvSpPr>
+          <p:cNvPr id="45" name="Rounded Rectangle 44">
+            <a:extLst>
+              <a:ext uri="{FF2B5EF4-FFF2-40B4-BE49-F238E27FC236}">
+                <a16:creationId xmlns:a16="http://schemas.microsoft.com/office/drawing/2014/main" id="{E8CB3032-73DF-234D-B39F-25C4FE595B46}"/>
+              </a:ext>
+            </a:extLst>
+          </p:cNvPr>
+          <p:cNvSpPr/>
+          <p:nvPr/>
+        </p:nvSpPr>
+        <p:spPr>
+          <a:xfrm>
+            <a:off x="7322769" y="790514"/>
+            <a:ext cx="2643743" cy="496530"/>
+          </a:xfrm>
+          <a:prstGeom prst="roundRect">
+            <a:avLst/>
+          </a:prstGeom>
+          <a:solidFill>
+            <a:srgbClr val="AB7942"/>
+          </a:solidFill>
+        </p:spPr>
+        <p:style>
+          <a:lnRef idx="2">
+            <a:schemeClr val="accent1">
+              <a:shade val="50000"/>
+            </a:schemeClr>
+          </a:lnRef>
+          <a:fillRef idx="1">
+            <a:schemeClr val="accent1"/>
+          </a:fillRef>
+          <a:effectRef idx="0">
+            <a:schemeClr val="accent1"/>
+          </a:effectRef>
+          <a:fontRef idx="minor">
+            <a:schemeClr val="lt1"/>
+          </a:fontRef>
+        </p:style>
+        <p:txBody>
+          <a:bodyPr rtlCol="0" anchor="ctr"/>
+          <a:lstStyle/>
+          <a:p>
+            <a:pPr algn="ctr"/>
+            <a:r>
+              <a:rPr lang="en-FR" dirty="0"/>
+              <a:t>metal</a:t>
+            </a:r>
+          </a:p>
+        </p:txBody>
+      </p:sp>
+      <p:sp>
+        <p:nvSpPr>
+          <p:cNvPr id="5" name="Rounded Rectangle 4">
+            <a:extLst>
+              <a:ext uri="{FF2B5EF4-FFF2-40B4-BE49-F238E27FC236}">
+                <a16:creationId xmlns:a16="http://schemas.microsoft.com/office/drawing/2014/main" id="{C4880B92-4B0B-BD4B-9CFC-C5FC8B3E62EF}"/>
+              </a:ext>
+            </a:extLst>
+          </p:cNvPr>
+          <p:cNvSpPr/>
+          <p:nvPr/>
+        </p:nvSpPr>
+        <p:spPr>
+          <a:xfrm>
+            <a:off x="7156077" y="3729154"/>
+            <a:ext cx="2977116" cy="628348"/>
+          </a:xfrm>
+          <a:prstGeom prst="roundRect">
+            <a:avLst/>
+          </a:prstGeom>
+          <a:noFill/>
+          <a:ln w="57150" cap="flat" cmpd="sng" algn="ctr">
+            <a:solidFill>
+              <a:srgbClr val="FF0000"/>
+            </a:solidFill>
+            <a:prstDash val="dash"/>
+            <a:round/>
+            <a:headEnd type="none" w="med" len="med"/>
+            <a:tailEnd type="none" w="med" len="med"/>
+          </a:ln>
+        </p:spPr>
+        <p:style>
+          <a:lnRef idx="0">
+            <a:scrgbClr r="0" g="0" b="0"/>
+          </a:lnRef>
+          <a:fillRef idx="0">
+            <a:scrgbClr r="0" g="0" b="0"/>
+          </a:fillRef>
+          <a:effectRef idx="0">
+            <a:scrgbClr r="0" g="0" b="0"/>
+          </a:effectRef>
+          <a:fontRef idx="minor">
+            <a:schemeClr val="accent2"/>
+          </a:fontRef>
+        </p:style>
+        <p:txBody>
+          <a:bodyPr rtlCol="0" anchor="ctr"/>
+          <a:lstStyle/>
+          <a:p>
+            <a:pPr algn="ctr"/>
+            <a:endParaRPr lang="en-FR"/>
+          </a:p>
+        </p:txBody>
+      </p:sp>
+      <p:sp>
+        <p:nvSpPr>
+          <p:cNvPr id="8" name="TextBox 7">
+            <a:extLst>
+              <a:ext uri="{FF2B5EF4-FFF2-40B4-BE49-F238E27FC236}">
+                <a16:creationId xmlns:a16="http://schemas.microsoft.com/office/drawing/2014/main" id="{AEB1D4AD-1EB2-6B45-A7D0-234F0CE63B6A}"/>
+              </a:ext>
+            </a:extLst>
+          </p:cNvPr>
+          <p:cNvSpPr txBox="1"/>
+          <p:nvPr/>
+        </p:nvSpPr>
+        <p:spPr>
+          <a:xfrm>
+            <a:off x="10191658" y="3857705"/>
+            <a:ext cx="2402958" cy="369332"/>
+          </a:xfrm>
+          <a:prstGeom prst="rect">
+            <a:avLst/>
+          </a:prstGeom>
+          <a:noFill/>
+        </p:spPr>
+        <p:txBody>
+          <a:bodyPr wrap="square" rtlCol="0">
+            <a:spAutoFit/>
+          </a:bodyPr>
+          <a:lstStyle/>
+          <a:p>
+            <a:r>
+              <a:rPr lang="en-FR" dirty="0">
+                <a:solidFill>
+                  <a:srgbClr val="FF0000"/>
+                </a:solidFill>
+              </a:rPr>
+              <a:t>Top predicted class</a:t>
+            </a:r>
+          </a:p>
+        </p:txBody>
+      </p:sp>
+      <p:sp>
+        <p:nvSpPr>
+          <p:cNvPr id="48" name="Right Arrow 47">
+            <a:extLst>
+              <a:ext uri="{FF2B5EF4-FFF2-40B4-BE49-F238E27FC236}">
+                <a16:creationId xmlns:a16="http://schemas.microsoft.com/office/drawing/2014/main" id="{876E1D27-385E-8F43-9F0F-9F8D3EB6D57B}"/>
+              </a:ext>
+            </a:extLst>
+          </p:cNvPr>
+          <p:cNvSpPr/>
+          <p:nvPr/>
+        </p:nvSpPr>
+        <p:spPr>
+          <a:xfrm>
+            <a:off x="2380555" y="2447602"/>
+            <a:ext cx="2233203" cy="2481202"/>
+          </a:xfrm>
+          <a:prstGeom prst="rightArrow">
+            <a:avLst>
+              <a:gd name="adj1" fmla="val 50000"/>
+              <a:gd name="adj2" fmla="val 21001"/>
+            </a:avLst>
+          </a:prstGeom>
+          <a:solidFill>
+            <a:schemeClr val="accent1">
+              <a:lumMod val="60000"/>
+              <a:lumOff val="40000"/>
+            </a:schemeClr>
+          </a:solidFill>
+          <a:ln>
+            <a:noFill/>
+          </a:ln>
+        </p:spPr>
+        <p:style>
+          <a:lnRef idx="2">
+            <a:schemeClr val="accent1">
+              <a:shade val="50000"/>
+            </a:schemeClr>
+          </a:lnRef>
+          <a:fillRef idx="1">
+            <a:schemeClr val="accent1"/>
+          </a:fillRef>
+          <a:effectRef idx="0">
+            <a:schemeClr val="accent1"/>
+          </a:effectRef>
+          <a:fontRef idx="minor">
+            <a:schemeClr val="lt1"/>
+          </a:fontRef>
+        </p:style>
+        <p:txBody>
+          <a:bodyPr rtlCol="0" anchor="ctr"/>
+          <a:lstStyle/>
+          <a:p>
+            <a:pPr algn="ctr"/>
+            <a:r>
+              <a:rPr lang="en-FR" sz="2000" dirty="0">
+                <a:latin typeface="Helvetica" pitchFamily="2" charset="0"/>
+              </a:rPr>
+              <a:t>Feature Extraction</a:t>
+            </a:r>
+          </a:p>
+        </p:txBody>
+      </p:sp>
+    </p:spTree>
+    <p:extLst>
+      <p:ext uri="{BB962C8B-B14F-4D97-AF65-F5344CB8AC3E}">
+        <p14:creationId xmlns:p14="http://schemas.microsoft.com/office/powerpoint/2010/main" val="223090866"/>
       </p:ext>
     </p:extLst>
   </p:cSld>

</xml_diff>